<commit_message>
uml/cd/associationAsAttributes: fix multiplicity of Piece to 1
</commit_message>
<xml_diff>
--- a/diagrams/uml/classDiagrams/associationsAsAttributes/squareMultiplicity.pptx
+++ b/diagrams/uml/classDiagrams/associationsAsAttributes/squareMultiplicity.pptx
@@ -304,7 +304,7 @@
           <a:p>
             <a:fld id="{A0F86979-30DA-49EE-A740-32EBA6D2B7DE}" type="datetimeFigureOut">
               <a:rPr lang="en-SG" smtClean="0"/>
-              <a:t>6/9/2017</a:t>
+              <a:t>19/11/2017</a:t>
             </a:fld>
             <a:endParaRPr lang="en-SG"/>
           </a:p>
@@ -474,7 +474,7 @@
           <a:p>
             <a:fld id="{A0F86979-30DA-49EE-A740-32EBA6D2B7DE}" type="datetimeFigureOut">
               <a:rPr lang="en-SG" smtClean="0"/>
-              <a:t>6/9/2017</a:t>
+              <a:t>19/11/2017</a:t>
             </a:fld>
             <a:endParaRPr lang="en-SG"/>
           </a:p>
@@ -654,7 +654,7 @@
           <a:p>
             <a:fld id="{A0F86979-30DA-49EE-A740-32EBA6D2B7DE}" type="datetimeFigureOut">
               <a:rPr lang="en-SG" smtClean="0"/>
-              <a:t>6/9/2017</a:t>
+              <a:t>19/11/2017</a:t>
             </a:fld>
             <a:endParaRPr lang="en-SG"/>
           </a:p>
@@ -824,7 +824,7 @@
           <a:p>
             <a:fld id="{A0F86979-30DA-49EE-A740-32EBA6D2B7DE}" type="datetimeFigureOut">
               <a:rPr lang="en-SG" smtClean="0"/>
-              <a:t>6/9/2017</a:t>
+              <a:t>19/11/2017</a:t>
             </a:fld>
             <a:endParaRPr lang="en-SG"/>
           </a:p>
@@ -1070,7 +1070,7 @@
           <a:p>
             <a:fld id="{A0F86979-30DA-49EE-A740-32EBA6D2B7DE}" type="datetimeFigureOut">
               <a:rPr lang="en-SG" smtClean="0"/>
-              <a:t>6/9/2017</a:t>
+              <a:t>19/11/2017</a:t>
             </a:fld>
             <a:endParaRPr lang="en-SG"/>
           </a:p>
@@ -1358,7 +1358,7 @@
           <a:p>
             <a:fld id="{A0F86979-30DA-49EE-A740-32EBA6D2B7DE}" type="datetimeFigureOut">
               <a:rPr lang="en-SG" smtClean="0"/>
-              <a:t>6/9/2017</a:t>
+              <a:t>19/11/2017</a:t>
             </a:fld>
             <a:endParaRPr lang="en-SG"/>
           </a:p>
@@ -1780,7 +1780,7 @@
           <a:p>
             <a:fld id="{A0F86979-30DA-49EE-A740-32EBA6D2B7DE}" type="datetimeFigureOut">
               <a:rPr lang="en-SG" smtClean="0"/>
-              <a:t>6/9/2017</a:t>
+              <a:t>19/11/2017</a:t>
             </a:fld>
             <a:endParaRPr lang="en-SG"/>
           </a:p>
@@ -1898,7 +1898,7 @@
           <a:p>
             <a:fld id="{A0F86979-30DA-49EE-A740-32EBA6D2B7DE}" type="datetimeFigureOut">
               <a:rPr lang="en-SG" smtClean="0"/>
-              <a:t>6/9/2017</a:t>
+              <a:t>19/11/2017</a:t>
             </a:fld>
             <a:endParaRPr lang="en-SG"/>
           </a:p>
@@ -1993,7 +1993,7 @@
           <a:p>
             <a:fld id="{A0F86979-30DA-49EE-A740-32EBA6D2B7DE}" type="datetimeFigureOut">
               <a:rPr lang="en-SG" smtClean="0"/>
-              <a:t>6/9/2017</a:t>
+              <a:t>19/11/2017</a:t>
             </a:fld>
             <a:endParaRPr lang="en-SG"/>
           </a:p>
@@ -2270,7 +2270,7 @@
           <a:p>
             <a:fld id="{A0F86979-30DA-49EE-A740-32EBA6D2B7DE}" type="datetimeFigureOut">
               <a:rPr lang="en-SG" smtClean="0"/>
-              <a:t>6/9/2017</a:t>
+              <a:t>19/11/2017</a:t>
             </a:fld>
             <a:endParaRPr lang="en-SG"/>
           </a:p>
@@ -2523,7 +2523,7 @@
           <a:p>
             <a:fld id="{A0F86979-30DA-49EE-A740-32EBA6D2B7DE}" type="datetimeFigureOut">
               <a:rPr lang="en-SG" smtClean="0"/>
-              <a:t>6/9/2017</a:t>
+              <a:t>19/11/2017</a:t>
             </a:fld>
             <a:endParaRPr lang="en-SG"/>
           </a:p>
@@ -2736,7 +2736,7 @@
           <a:p>
             <a:fld id="{A0F86979-30DA-49EE-A740-32EBA6D2B7DE}" type="datetimeFigureOut">
               <a:rPr lang="en-SG" smtClean="0"/>
-              <a:t>6/9/2017</a:t>
+              <a:t>19/11/2017</a:t>
             </a:fld>
             <a:endParaRPr lang="en-SG"/>
           </a:p>
@@ -4018,7 +4018,7 @@
         </p:nvSpPr>
         <p:spPr>
           <a:xfrm rot="16200000">
-            <a:off x="-93022" y="2382798"/>
+            <a:off x="345841" y="2544128"/>
             <a:ext cx="1371600" cy="369332"/>
           </a:xfrm>
           <a:prstGeom prst="rect">
@@ -4273,7 +4273,7 @@
         </p:nvSpPr>
         <p:spPr>
           <a:xfrm>
-            <a:off x="2008312" y="2186464"/>
+            <a:off x="3474265" y="1972628"/>
             <a:ext cx="381000" cy="381000"/>
           </a:xfrm>
           <a:prstGeom prst="rect">
@@ -5237,7 +5237,7 @@
         </p:nvSpPr>
         <p:spPr>
           <a:xfrm rot="16200000">
-            <a:off x="5161401" y="2403396"/>
+            <a:off x="5643967" y="2595063"/>
             <a:ext cx="1371600" cy="369332"/>
           </a:xfrm>
           <a:prstGeom prst="rect">
@@ -5436,7 +5436,7 @@
         </p:nvSpPr>
         <p:spPr>
           <a:xfrm>
-            <a:off x="7262735" y="2207062"/>
+            <a:off x="8746841" y="1984296"/>
             <a:ext cx="381000" cy="381000"/>
           </a:xfrm>
           <a:prstGeom prst="rect">
@@ -6137,29 +6137,8 @@
                 <a:uFillTx/>
                 <a:latin typeface="Calibri" pitchFamily="34" charset="0"/>
               </a:rPr>
-              <a:t>       </a:t>
-            </a:r>
-            <a:r>
-              <a:rPr kumimoji="0" lang="en-US" sz="1800" i="0" u="none" strike="noStrike" kern="0" cap="none" spc="0" normalizeH="0" baseline="0" noProof="0" dirty="0" smtClean="0">
-                <a:ln>
-                  <a:noFill/>
-                </a:ln>
-                <a:effectLst/>
-                <a:uLnTx/>
-                <a:uFillTx/>
-                <a:latin typeface="Calibri" pitchFamily="34" charset="0"/>
-              </a:rPr>
-              <a:t>100</a:t>
-            </a:r>
-            <a:endParaRPr kumimoji="0" lang="en-US" sz="1800" i="0" u="none" strike="noStrike" kern="0" cap="none" spc="0" normalizeH="0" baseline="0" noProof="0" dirty="0" smtClean="0">
-              <a:ln>
-                <a:noFill/>
-              </a:ln>
-              <a:effectLst/>
-              <a:uLnTx/>
-              <a:uFillTx/>
-              <a:latin typeface="Calibri" pitchFamily="34" charset="0"/>
-            </a:endParaRPr>
+              <a:t>       100</a:t>
+            </a:r>
           </a:p>
         </p:txBody>
       </p:sp>
@@ -6221,7 +6200,282 @@
               <a:rPr lang="en-US" dirty="0"/>
               <a:t>100</a:t>
             </a:r>
-            <a:endParaRPr lang="en-US" dirty="0"/>
+          </a:p>
+        </p:txBody>
+      </p:sp>
+      <p:sp>
+        <p:nvSpPr>
+          <p:cNvPr id="4" name="Isosceles Triangle 3"/>
+          <p:cNvSpPr/>
+          <p:nvPr/>
+        </p:nvSpPr>
+        <p:spPr>
+          <a:xfrm>
+            <a:off x="976062" y="2119194"/>
+            <a:ext cx="140324" cy="95843"/>
+          </a:xfrm>
+          <a:prstGeom prst="triangle">
+            <a:avLst/>
+          </a:prstGeom>
+          <a:solidFill>
+            <a:schemeClr val="tx1"/>
+          </a:solidFill>
+          <a:ln>
+            <a:noFill/>
+          </a:ln>
+        </p:spPr>
+        <p:style>
+          <a:lnRef idx="2">
+            <a:schemeClr val="accent1">
+              <a:shade val="50000"/>
+            </a:schemeClr>
+          </a:lnRef>
+          <a:fillRef idx="1">
+            <a:schemeClr val="accent1"/>
+          </a:fillRef>
+          <a:effectRef idx="0">
+            <a:schemeClr val="accent1"/>
+          </a:effectRef>
+          <a:fontRef idx="minor">
+            <a:schemeClr val="lt1"/>
+          </a:fontRef>
+        </p:style>
+        <p:txBody>
+          <a:bodyPr rtlCol="0" anchor="ctr"/>
+          <a:lstStyle/>
+          <a:p>
+            <a:pPr algn="ctr"/>
+            <a:endParaRPr lang="en-US"/>
+          </a:p>
+        </p:txBody>
+      </p:sp>
+      <p:sp>
+        <p:nvSpPr>
+          <p:cNvPr id="50" name="Isosceles Triangle 49"/>
+          <p:cNvSpPr/>
+          <p:nvPr/>
+        </p:nvSpPr>
+        <p:spPr>
+          <a:xfrm>
+            <a:off x="6274633" y="2163128"/>
+            <a:ext cx="140324" cy="95843"/>
+          </a:xfrm>
+          <a:prstGeom prst="triangle">
+            <a:avLst/>
+          </a:prstGeom>
+          <a:solidFill>
+            <a:schemeClr val="tx1"/>
+          </a:solidFill>
+          <a:ln>
+            <a:noFill/>
+          </a:ln>
+        </p:spPr>
+        <p:style>
+          <a:lnRef idx="2">
+            <a:schemeClr val="accent1">
+              <a:shade val="50000"/>
+            </a:schemeClr>
+          </a:lnRef>
+          <a:fillRef idx="1">
+            <a:schemeClr val="accent1"/>
+          </a:fillRef>
+          <a:effectRef idx="0">
+            <a:schemeClr val="accent1"/>
+          </a:effectRef>
+          <a:fontRef idx="minor">
+            <a:schemeClr val="lt1"/>
+          </a:fontRef>
+        </p:style>
+        <p:txBody>
+          <a:bodyPr rtlCol="0" anchor="ctr"/>
+          <a:lstStyle/>
+          <a:p>
+            <a:pPr algn="ctr"/>
+            <a:endParaRPr lang="en-US"/>
+          </a:p>
+        </p:txBody>
+      </p:sp>
+      <p:sp>
+        <p:nvSpPr>
+          <p:cNvPr id="51" name="Isosceles Triangle 50"/>
+          <p:cNvSpPr/>
+          <p:nvPr/>
+        </p:nvSpPr>
+        <p:spPr>
+          <a:xfrm rot="5400000">
+            <a:off x="2802420" y="1504961"/>
+            <a:ext cx="140324" cy="95843"/>
+          </a:xfrm>
+          <a:prstGeom prst="triangle">
+            <a:avLst/>
+          </a:prstGeom>
+          <a:solidFill>
+            <a:schemeClr val="tx1"/>
+          </a:solidFill>
+          <a:ln>
+            <a:noFill/>
+          </a:ln>
+        </p:spPr>
+        <p:style>
+          <a:lnRef idx="2">
+            <a:schemeClr val="accent1">
+              <a:shade val="50000"/>
+            </a:schemeClr>
+          </a:lnRef>
+          <a:fillRef idx="1">
+            <a:schemeClr val="accent1"/>
+          </a:fillRef>
+          <a:effectRef idx="0">
+            <a:schemeClr val="accent1"/>
+          </a:effectRef>
+          <a:fontRef idx="minor">
+            <a:schemeClr val="lt1"/>
+          </a:fontRef>
+        </p:style>
+        <p:txBody>
+          <a:bodyPr rtlCol="0" anchor="ctr"/>
+          <a:lstStyle/>
+          <a:p>
+            <a:pPr algn="ctr"/>
+            <a:endParaRPr lang="en-US"/>
+          </a:p>
+        </p:txBody>
+      </p:sp>
+      <p:sp>
+        <p:nvSpPr>
+          <p:cNvPr id="52" name="Isosceles Triangle 51"/>
+          <p:cNvSpPr/>
+          <p:nvPr/>
+        </p:nvSpPr>
+        <p:spPr>
+          <a:xfrm rot="5400000">
+            <a:off x="8106973" y="1535036"/>
+            <a:ext cx="140324" cy="95843"/>
+          </a:xfrm>
+          <a:prstGeom prst="triangle">
+            <a:avLst/>
+          </a:prstGeom>
+          <a:solidFill>
+            <a:schemeClr val="tx1"/>
+          </a:solidFill>
+          <a:ln>
+            <a:noFill/>
+          </a:ln>
+        </p:spPr>
+        <p:style>
+          <a:lnRef idx="2">
+            <a:schemeClr val="accent1">
+              <a:shade val="50000"/>
+            </a:schemeClr>
+          </a:lnRef>
+          <a:fillRef idx="1">
+            <a:schemeClr val="accent1"/>
+          </a:fillRef>
+          <a:effectRef idx="0">
+            <a:schemeClr val="accent1"/>
+          </a:effectRef>
+          <a:fontRef idx="minor">
+            <a:schemeClr val="lt1"/>
+          </a:fontRef>
+        </p:style>
+        <p:txBody>
+          <a:bodyPr rtlCol="0" anchor="ctr"/>
+          <a:lstStyle/>
+          <a:p>
+            <a:pPr algn="ctr"/>
+            <a:endParaRPr lang="en-US"/>
+          </a:p>
+        </p:txBody>
+      </p:sp>
+      <p:sp>
+        <p:nvSpPr>
+          <p:cNvPr id="53" name="Isosceles Triangle 52"/>
+          <p:cNvSpPr/>
+          <p:nvPr/>
+        </p:nvSpPr>
+        <p:spPr>
+          <a:xfrm rot="16200000" flipH="1">
+            <a:off x="2558269" y="2115207"/>
+            <a:ext cx="140324" cy="95843"/>
+          </a:xfrm>
+          <a:prstGeom prst="triangle">
+            <a:avLst/>
+          </a:prstGeom>
+          <a:solidFill>
+            <a:schemeClr val="tx1"/>
+          </a:solidFill>
+          <a:ln>
+            <a:noFill/>
+          </a:ln>
+        </p:spPr>
+        <p:style>
+          <a:lnRef idx="2">
+            <a:schemeClr val="accent1">
+              <a:shade val="50000"/>
+            </a:schemeClr>
+          </a:lnRef>
+          <a:fillRef idx="1">
+            <a:schemeClr val="accent1"/>
+          </a:fillRef>
+          <a:effectRef idx="0">
+            <a:schemeClr val="accent1"/>
+          </a:effectRef>
+          <a:fontRef idx="minor">
+            <a:schemeClr val="lt1"/>
+          </a:fontRef>
+        </p:style>
+        <p:txBody>
+          <a:bodyPr rtlCol="0" anchor="ctr"/>
+          <a:lstStyle/>
+          <a:p>
+            <a:pPr algn="ctr"/>
+            <a:endParaRPr lang="en-US"/>
+          </a:p>
+        </p:txBody>
+      </p:sp>
+      <p:sp>
+        <p:nvSpPr>
+          <p:cNvPr id="54" name="Isosceles Triangle 53"/>
+          <p:cNvSpPr/>
+          <p:nvPr/>
+        </p:nvSpPr>
+        <p:spPr>
+          <a:xfrm rot="16200000" flipH="1">
+            <a:off x="7892071" y="2116307"/>
+            <a:ext cx="140324" cy="95843"/>
+          </a:xfrm>
+          <a:prstGeom prst="triangle">
+            <a:avLst/>
+          </a:prstGeom>
+          <a:solidFill>
+            <a:schemeClr val="tx1"/>
+          </a:solidFill>
+          <a:ln>
+            <a:noFill/>
+          </a:ln>
+        </p:spPr>
+        <p:style>
+          <a:lnRef idx="2">
+            <a:schemeClr val="accent1">
+              <a:shade val="50000"/>
+            </a:schemeClr>
+          </a:lnRef>
+          <a:fillRef idx="1">
+            <a:schemeClr val="accent1"/>
+          </a:fillRef>
+          <a:effectRef idx="0">
+            <a:schemeClr val="accent1"/>
+          </a:effectRef>
+          <a:fontRef idx="minor">
+            <a:schemeClr val="lt1"/>
+          </a:fontRef>
+        </p:style>
+        <p:txBody>
+          <a:bodyPr rtlCol="0" anchor="ctr"/>
+          <a:lstStyle/>
+          <a:p>
+            <a:pPr algn="ctr"/>
+            <a:endParaRPr lang="en-US"/>
           </a:p>
         </p:txBody>
       </p:sp>

</xml_diff>

<commit_message>
uml/cd/associationAsAttributes: correct association label direction
</commit_message>
<xml_diff>
--- a/diagrams/uml/classDiagrams/associationsAsAttributes/squareMultiplicity.pptx
+++ b/diagrams/uml/classDiagrams/associationsAsAttributes/squareMultiplicity.pptx
@@ -6302,8 +6302,8 @@
           <p:nvPr/>
         </p:nvSpPr>
         <p:spPr>
-          <a:xfrm rot="5400000">
-            <a:off x="2802420" y="1504961"/>
+          <a:xfrm rot="16200000" flipH="1">
+            <a:off x="2083786" y="1508190"/>
             <a:ext cx="140324" cy="95843"/>
           </a:xfrm>
           <a:prstGeom prst="triangle">
@@ -6343,13 +6343,13 @@
       </p:sp>
       <p:sp>
         <p:nvSpPr>
-          <p:cNvPr id="52" name="Isosceles Triangle 51"/>
+          <p:cNvPr id="53" name="Isosceles Triangle 52"/>
           <p:cNvSpPr/>
           <p:nvPr/>
         </p:nvSpPr>
         <p:spPr>
-          <a:xfrm rot="5400000">
-            <a:off x="8106973" y="1535036"/>
+          <a:xfrm rot="16200000" flipH="1">
+            <a:off x="2558269" y="2115207"/>
             <a:ext cx="140324" cy="95843"/>
           </a:xfrm>
           <a:prstGeom prst="triangle">
@@ -6389,13 +6389,13 @@
       </p:sp>
       <p:sp>
         <p:nvSpPr>
-          <p:cNvPr id="53" name="Isosceles Triangle 52"/>
+          <p:cNvPr id="54" name="Isosceles Triangle 53"/>
           <p:cNvSpPr/>
           <p:nvPr/>
         </p:nvSpPr>
         <p:spPr>
           <a:xfrm rot="16200000" flipH="1">
-            <a:off x="2558269" y="2115207"/>
+            <a:off x="7892071" y="2116307"/>
             <a:ext cx="140324" cy="95843"/>
           </a:xfrm>
           <a:prstGeom prst="triangle">
@@ -6435,13 +6435,13 @@
       </p:sp>
       <p:sp>
         <p:nvSpPr>
-          <p:cNvPr id="54" name="Isosceles Triangle 53"/>
+          <p:cNvPr id="55" name="Isosceles Triangle 54"/>
           <p:cNvSpPr/>
           <p:nvPr/>
         </p:nvSpPr>
         <p:spPr>
           <a:xfrm rot="16200000" flipH="1">
-            <a:off x="7892071" y="2116307"/>
+            <a:off x="7391107" y="1525037"/>
             <a:ext cx="140324" cy="95843"/>
           </a:xfrm>
           <a:prstGeom prst="triangle">

</xml_diff>

<commit_message>
uml: Correct association label direction in square game
</commit_message>
<xml_diff>
--- a/diagrams/uml/classDiagrams/associationsAsAttributes/squareMultiplicity.pptx
+++ b/diagrams/uml/classDiagrams/associationsAsAttributes/squareMultiplicity.pptx
@@ -161,7 +161,7 @@
           <a:lstStyle/>
           <a:p>
             <a:r>
-              <a:rPr lang="en-US" smtClean="0"/>
+              <a:rPr lang="en-US"/>
               <a:t>Click to edit Master title style</a:t>
             </a:r>
             <a:endParaRPr lang="en-SG"/>
@@ -280,7 +280,7 @@
           </a:lstStyle>
           <a:p>
             <a:r>
-              <a:rPr lang="en-US" smtClean="0"/>
+              <a:rPr lang="en-US"/>
               <a:t>Click to edit Master subtitle style</a:t>
             </a:r>
             <a:endParaRPr lang="en-SG"/>
@@ -304,7 +304,7 @@
           <a:p>
             <a:fld id="{A0F86979-30DA-49EE-A740-32EBA6D2B7DE}" type="datetimeFigureOut">
               <a:rPr lang="en-SG" smtClean="0"/>
-              <a:t>19/11/2017</a:t>
+              <a:t>8/2/2024</a:t>
             </a:fld>
             <a:endParaRPr lang="en-SG"/>
           </a:p>
@@ -398,7 +398,7 @@
           <a:lstStyle/>
           <a:p>
             <a:r>
-              <a:rPr lang="en-US" smtClean="0"/>
+              <a:rPr lang="en-US"/>
               <a:t>Click to edit Master title style</a:t>
             </a:r>
             <a:endParaRPr lang="en-SG"/>
@@ -422,35 +422,35 @@
           <a:p>
             <a:pPr lvl="0"/>
             <a:r>
-              <a:rPr lang="en-US" smtClean="0"/>
+              <a:rPr lang="en-US"/>
               <a:t>Click to edit Master text styles</a:t>
             </a:r>
           </a:p>
           <a:p>
             <a:pPr lvl="1"/>
             <a:r>
-              <a:rPr lang="en-US" smtClean="0"/>
+              <a:rPr lang="en-US"/>
               <a:t>Second level</a:t>
             </a:r>
           </a:p>
           <a:p>
             <a:pPr lvl="2"/>
             <a:r>
-              <a:rPr lang="en-US" smtClean="0"/>
+              <a:rPr lang="en-US"/>
               <a:t>Third level</a:t>
             </a:r>
           </a:p>
           <a:p>
             <a:pPr lvl="3"/>
             <a:r>
-              <a:rPr lang="en-US" smtClean="0"/>
+              <a:rPr lang="en-US"/>
               <a:t>Fourth level</a:t>
             </a:r>
           </a:p>
           <a:p>
             <a:pPr lvl="4"/>
             <a:r>
-              <a:rPr lang="en-US" smtClean="0"/>
+              <a:rPr lang="en-US"/>
               <a:t>Fifth level</a:t>
             </a:r>
             <a:endParaRPr lang="en-SG"/>
@@ -474,7 +474,7 @@
           <a:p>
             <a:fld id="{A0F86979-30DA-49EE-A740-32EBA6D2B7DE}" type="datetimeFigureOut">
               <a:rPr lang="en-SG" smtClean="0"/>
-              <a:t>19/11/2017</a:t>
+              <a:t>8/2/2024</a:t>
             </a:fld>
             <a:endParaRPr lang="en-SG"/>
           </a:p>
@@ -573,7 +573,7 @@
           <a:lstStyle/>
           <a:p>
             <a:r>
-              <a:rPr lang="en-US" smtClean="0"/>
+              <a:rPr lang="en-US"/>
               <a:t>Click to edit Master title style</a:t>
             </a:r>
             <a:endParaRPr lang="en-SG"/>
@@ -602,35 +602,35 @@
           <a:p>
             <a:pPr lvl="0"/>
             <a:r>
-              <a:rPr lang="en-US" smtClean="0"/>
+              <a:rPr lang="en-US"/>
               <a:t>Click to edit Master text styles</a:t>
             </a:r>
           </a:p>
           <a:p>
             <a:pPr lvl="1"/>
             <a:r>
-              <a:rPr lang="en-US" smtClean="0"/>
+              <a:rPr lang="en-US"/>
               <a:t>Second level</a:t>
             </a:r>
           </a:p>
           <a:p>
             <a:pPr lvl="2"/>
             <a:r>
-              <a:rPr lang="en-US" smtClean="0"/>
+              <a:rPr lang="en-US"/>
               <a:t>Third level</a:t>
             </a:r>
           </a:p>
           <a:p>
             <a:pPr lvl="3"/>
             <a:r>
-              <a:rPr lang="en-US" smtClean="0"/>
+              <a:rPr lang="en-US"/>
               <a:t>Fourth level</a:t>
             </a:r>
           </a:p>
           <a:p>
             <a:pPr lvl="4"/>
             <a:r>
-              <a:rPr lang="en-US" smtClean="0"/>
+              <a:rPr lang="en-US"/>
               <a:t>Fifth level</a:t>
             </a:r>
             <a:endParaRPr lang="en-SG"/>
@@ -654,7 +654,7 @@
           <a:p>
             <a:fld id="{A0F86979-30DA-49EE-A740-32EBA6D2B7DE}" type="datetimeFigureOut">
               <a:rPr lang="en-SG" smtClean="0"/>
-              <a:t>19/11/2017</a:t>
+              <a:t>8/2/2024</a:t>
             </a:fld>
             <a:endParaRPr lang="en-SG"/>
           </a:p>
@@ -748,7 +748,7 @@
           <a:lstStyle/>
           <a:p>
             <a:r>
-              <a:rPr lang="en-US" smtClean="0"/>
+              <a:rPr lang="en-US"/>
               <a:t>Click to edit Master title style</a:t>
             </a:r>
             <a:endParaRPr lang="en-SG"/>
@@ -772,35 +772,35 @@
           <a:p>
             <a:pPr lvl="0"/>
             <a:r>
-              <a:rPr lang="en-US" smtClean="0"/>
+              <a:rPr lang="en-US"/>
               <a:t>Click to edit Master text styles</a:t>
             </a:r>
           </a:p>
           <a:p>
             <a:pPr lvl="1"/>
             <a:r>
-              <a:rPr lang="en-US" smtClean="0"/>
+              <a:rPr lang="en-US"/>
               <a:t>Second level</a:t>
             </a:r>
           </a:p>
           <a:p>
             <a:pPr lvl="2"/>
             <a:r>
-              <a:rPr lang="en-US" smtClean="0"/>
+              <a:rPr lang="en-US"/>
               <a:t>Third level</a:t>
             </a:r>
           </a:p>
           <a:p>
             <a:pPr lvl="3"/>
             <a:r>
-              <a:rPr lang="en-US" smtClean="0"/>
+              <a:rPr lang="en-US"/>
               <a:t>Fourth level</a:t>
             </a:r>
           </a:p>
           <a:p>
             <a:pPr lvl="4"/>
             <a:r>
-              <a:rPr lang="en-US" smtClean="0"/>
+              <a:rPr lang="en-US"/>
               <a:t>Fifth level</a:t>
             </a:r>
             <a:endParaRPr lang="en-SG"/>
@@ -824,7 +824,7 @@
           <a:p>
             <a:fld id="{A0F86979-30DA-49EE-A740-32EBA6D2B7DE}" type="datetimeFigureOut">
               <a:rPr lang="en-SG" smtClean="0"/>
-              <a:t>19/11/2017</a:t>
+              <a:t>8/2/2024</a:t>
             </a:fld>
             <a:endParaRPr lang="en-SG"/>
           </a:p>
@@ -927,7 +927,7 @@
           </a:lstStyle>
           <a:p>
             <a:r>
-              <a:rPr lang="en-US" smtClean="0"/>
+              <a:rPr lang="en-US"/>
               <a:t>Click to edit Master title style</a:t>
             </a:r>
             <a:endParaRPr lang="en-SG"/>
@@ -1047,7 +1047,7 @@
           <a:p>
             <a:pPr lvl="0"/>
             <a:r>
-              <a:rPr lang="en-US" smtClean="0"/>
+              <a:rPr lang="en-US"/>
               <a:t>Click to edit Master text styles</a:t>
             </a:r>
           </a:p>
@@ -1070,7 +1070,7 @@
           <a:p>
             <a:fld id="{A0F86979-30DA-49EE-A740-32EBA6D2B7DE}" type="datetimeFigureOut">
               <a:rPr lang="en-SG" smtClean="0"/>
-              <a:t>19/11/2017</a:t>
+              <a:t>8/2/2024</a:t>
             </a:fld>
             <a:endParaRPr lang="en-SG"/>
           </a:p>
@@ -1164,7 +1164,7 @@
           <a:lstStyle/>
           <a:p>
             <a:r>
-              <a:rPr lang="en-US" smtClean="0"/>
+              <a:rPr lang="en-US"/>
               <a:t>Click to edit Master title style</a:t>
             </a:r>
             <a:endParaRPr lang="en-SG"/>
@@ -1221,35 +1221,35 @@
           <a:p>
             <a:pPr lvl="0"/>
             <a:r>
-              <a:rPr lang="en-US" smtClean="0"/>
+              <a:rPr lang="en-US"/>
               <a:t>Click to edit Master text styles</a:t>
             </a:r>
           </a:p>
           <a:p>
             <a:pPr lvl="1"/>
             <a:r>
-              <a:rPr lang="en-US" smtClean="0"/>
+              <a:rPr lang="en-US"/>
               <a:t>Second level</a:t>
             </a:r>
           </a:p>
           <a:p>
             <a:pPr lvl="2"/>
             <a:r>
-              <a:rPr lang="en-US" smtClean="0"/>
+              <a:rPr lang="en-US"/>
               <a:t>Third level</a:t>
             </a:r>
           </a:p>
           <a:p>
             <a:pPr lvl="3"/>
             <a:r>
-              <a:rPr lang="en-US" smtClean="0"/>
+              <a:rPr lang="en-US"/>
               <a:t>Fourth level</a:t>
             </a:r>
           </a:p>
           <a:p>
             <a:pPr lvl="4"/>
             <a:r>
-              <a:rPr lang="en-US" smtClean="0"/>
+              <a:rPr lang="en-US"/>
               <a:t>Fifth level</a:t>
             </a:r>
             <a:endParaRPr lang="en-SG"/>
@@ -1306,35 +1306,35 @@
           <a:p>
             <a:pPr lvl="0"/>
             <a:r>
-              <a:rPr lang="en-US" smtClean="0"/>
+              <a:rPr lang="en-US"/>
               <a:t>Click to edit Master text styles</a:t>
             </a:r>
           </a:p>
           <a:p>
             <a:pPr lvl="1"/>
             <a:r>
-              <a:rPr lang="en-US" smtClean="0"/>
+              <a:rPr lang="en-US"/>
               <a:t>Second level</a:t>
             </a:r>
           </a:p>
           <a:p>
             <a:pPr lvl="2"/>
             <a:r>
-              <a:rPr lang="en-US" smtClean="0"/>
+              <a:rPr lang="en-US"/>
               <a:t>Third level</a:t>
             </a:r>
           </a:p>
           <a:p>
             <a:pPr lvl="3"/>
             <a:r>
-              <a:rPr lang="en-US" smtClean="0"/>
+              <a:rPr lang="en-US"/>
               <a:t>Fourth level</a:t>
             </a:r>
           </a:p>
           <a:p>
             <a:pPr lvl="4"/>
             <a:r>
-              <a:rPr lang="en-US" smtClean="0"/>
+              <a:rPr lang="en-US"/>
               <a:t>Fifth level</a:t>
             </a:r>
             <a:endParaRPr lang="en-SG"/>
@@ -1358,7 +1358,7 @@
           <a:p>
             <a:fld id="{A0F86979-30DA-49EE-A740-32EBA6D2B7DE}" type="datetimeFigureOut">
               <a:rPr lang="en-SG" smtClean="0"/>
-              <a:t>19/11/2017</a:t>
+              <a:t>8/2/2024</a:t>
             </a:fld>
             <a:endParaRPr lang="en-SG"/>
           </a:p>
@@ -1456,7 +1456,7 @@
           </a:lstStyle>
           <a:p>
             <a:r>
-              <a:rPr lang="en-US" smtClean="0"/>
+              <a:rPr lang="en-US"/>
               <a:t>Click to edit Master title style</a:t>
             </a:r>
             <a:endParaRPr lang="en-SG"/>
@@ -1522,7 +1522,7 @@
           <a:p>
             <a:pPr lvl="0"/>
             <a:r>
-              <a:rPr lang="en-US" smtClean="0"/>
+              <a:rPr lang="en-US"/>
               <a:t>Click to edit Master text styles</a:t>
             </a:r>
           </a:p>
@@ -1578,35 +1578,35 @@
           <a:p>
             <a:pPr lvl="0"/>
             <a:r>
-              <a:rPr lang="en-US" smtClean="0"/>
+              <a:rPr lang="en-US"/>
               <a:t>Click to edit Master text styles</a:t>
             </a:r>
           </a:p>
           <a:p>
             <a:pPr lvl="1"/>
             <a:r>
-              <a:rPr lang="en-US" smtClean="0"/>
+              <a:rPr lang="en-US"/>
               <a:t>Second level</a:t>
             </a:r>
           </a:p>
           <a:p>
             <a:pPr lvl="2"/>
             <a:r>
-              <a:rPr lang="en-US" smtClean="0"/>
+              <a:rPr lang="en-US"/>
               <a:t>Third level</a:t>
             </a:r>
           </a:p>
           <a:p>
             <a:pPr lvl="3"/>
             <a:r>
-              <a:rPr lang="en-US" smtClean="0"/>
+              <a:rPr lang="en-US"/>
               <a:t>Fourth level</a:t>
             </a:r>
           </a:p>
           <a:p>
             <a:pPr lvl="4"/>
             <a:r>
-              <a:rPr lang="en-US" smtClean="0"/>
+              <a:rPr lang="en-US"/>
               <a:t>Fifth level</a:t>
             </a:r>
             <a:endParaRPr lang="en-SG"/>
@@ -1672,7 +1672,7 @@
           <a:p>
             <a:pPr lvl="0"/>
             <a:r>
-              <a:rPr lang="en-US" smtClean="0"/>
+              <a:rPr lang="en-US"/>
               <a:t>Click to edit Master text styles</a:t>
             </a:r>
           </a:p>
@@ -1728,35 +1728,35 @@
           <a:p>
             <a:pPr lvl="0"/>
             <a:r>
-              <a:rPr lang="en-US" smtClean="0"/>
+              <a:rPr lang="en-US"/>
               <a:t>Click to edit Master text styles</a:t>
             </a:r>
           </a:p>
           <a:p>
             <a:pPr lvl="1"/>
             <a:r>
-              <a:rPr lang="en-US" smtClean="0"/>
+              <a:rPr lang="en-US"/>
               <a:t>Second level</a:t>
             </a:r>
           </a:p>
           <a:p>
             <a:pPr lvl="2"/>
             <a:r>
-              <a:rPr lang="en-US" smtClean="0"/>
+              <a:rPr lang="en-US"/>
               <a:t>Third level</a:t>
             </a:r>
           </a:p>
           <a:p>
             <a:pPr lvl="3"/>
             <a:r>
-              <a:rPr lang="en-US" smtClean="0"/>
+              <a:rPr lang="en-US"/>
               <a:t>Fourth level</a:t>
             </a:r>
           </a:p>
           <a:p>
             <a:pPr lvl="4"/>
             <a:r>
-              <a:rPr lang="en-US" smtClean="0"/>
+              <a:rPr lang="en-US"/>
               <a:t>Fifth level</a:t>
             </a:r>
             <a:endParaRPr lang="en-SG"/>
@@ -1780,7 +1780,7 @@
           <a:p>
             <a:fld id="{A0F86979-30DA-49EE-A740-32EBA6D2B7DE}" type="datetimeFigureOut">
               <a:rPr lang="en-SG" smtClean="0"/>
-              <a:t>19/11/2017</a:t>
+              <a:t>8/2/2024</a:t>
             </a:fld>
             <a:endParaRPr lang="en-SG"/>
           </a:p>
@@ -1874,7 +1874,7 @@
           <a:lstStyle/>
           <a:p>
             <a:r>
-              <a:rPr lang="en-US" smtClean="0"/>
+              <a:rPr lang="en-US"/>
               <a:t>Click to edit Master title style</a:t>
             </a:r>
             <a:endParaRPr lang="en-SG"/>
@@ -1898,7 +1898,7 @@
           <a:p>
             <a:fld id="{A0F86979-30DA-49EE-A740-32EBA6D2B7DE}" type="datetimeFigureOut">
               <a:rPr lang="en-SG" smtClean="0"/>
-              <a:t>19/11/2017</a:t>
+              <a:t>8/2/2024</a:t>
             </a:fld>
             <a:endParaRPr lang="en-SG"/>
           </a:p>
@@ -1993,7 +1993,7 @@
           <a:p>
             <a:fld id="{A0F86979-30DA-49EE-A740-32EBA6D2B7DE}" type="datetimeFigureOut">
               <a:rPr lang="en-SG" smtClean="0"/>
-              <a:t>19/11/2017</a:t>
+              <a:t>8/2/2024</a:t>
             </a:fld>
             <a:endParaRPr lang="en-SG"/>
           </a:p>
@@ -2096,7 +2096,7 @@
           </a:lstStyle>
           <a:p>
             <a:r>
-              <a:rPr lang="en-US" smtClean="0"/>
+              <a:rPr lang="en-US"/>
               <a:t>Click to edit Master title style</a:t>
             </a:r>
             <a:endParaRPr lang="en-SG"/>
@@ -2153,35 +2153,35 @@
           <a:p>
             <a:pPr lvl="0"/>
             <a:r>
-              <a:rPr lang="en-US" smtClean="0"/>
+              <a:rPr lang="en-US"/>
               <a:t>Click to edit Master text styles</a:t>
             </a:r>
           </a:p>
           <a:p>
             <a:pPr lvl="1"/>
             <a:r>
-              <a:rPr lang="en-US" smtClean="0"/>
+              <a:rPr lang="en-US"/>
               <a:t>Second level</a:t>
             </a:r>
           </a:p>
           <a:p>
             <a:pPr lvl="2"/>
             <a:r>
-              <a:rPr lang="en-US" smtClean="0"/>
+              <a:rPr lang="en-US"/>
               <a:t>Third level</a:t>
             </a:r>
           </a:p>
           <a:p>
             <a:pPr lvl="3"/>
             <a:r>
-              <a:rPr lang="en-US" smtClean="0"/>
+              <a:rPr lang="en-US"/>
               <a:t>Fourth level</a:t>
             </a:r>
           </a:p>
           <a:p>
             <a:pPr lvl="4"/>
             <a:r>
-              <a:rPr lang="en-US" smtClean="0"/>
+              <a:rPr lang="en-US"/>
               <a:t>Fifth level</a:t>
             </a:r>
             <a:endParaRPr lang="en-SG"/>
@@ -2247,7 +2247,7 @@
           <a:p>
             <a:pPr lvl="0"/>
             <a:r>
-              <a:rPr lang="en-US" smtClean="0"/>
+              <a:rPr lang="en-US"/>
               <a:t>Click to edit Master text styles</a:t>
             </a:r>
           </a:p>
@@ -2270,7 +2270,7 @@
           <a:p>
             <a:fld id="{A0F86979-30DA-49EE-A740-32EBA6D2B7DE}" type="datetimeFigureOut">
               <a:rPr lang="en-SG" smtClean="0"/>
-              <a:t>19/11/2017</a:t>
+              <a:t>8/2/2024</a:t>
             </a:fld>
             <a:endParaRPr lang="en-SG"/>
           </a:p>
@@ -2373,7 +2373,7 @@
           </a:lstStyle>
           <a:p>
             <a:r>
-              <a:rPr lang="en-US" smtClean="0"/>
+              <a:rPr lang="en-US"/>
               <a:t>Click to edit Master title style</a:t>
             </a:r>
             <a:endParaRPr lang="en-SG"/>
@@ -2500,7 +2500,7 @@
           <a:p>
             <a:pPr lvl="0"/>
             <a:r>
-              <a:rPr lang="en-US" smtClean="0"/>
+              <a:rPr lang="en-US"/>
               <a:t>Click to edit Master text styles</a:t>
             </a:r>
           </a:p>
@@ -2523,7 +2523,7 @@
           <a:p>
             <a:fld id="{A0F86979-30DA-49EE-A740-32EBA6D2B7DE}" type="datetimeFigureOut">
               <a:rPr lang="en-SG" smtClean="0"/>
-              <a:t>19/11/2017</a:t>
+              <a:t>8/2/2024</a:t>
             </a:fld>
             <a:endParaRPr lang="en-SG"/>
           </a:p>
@@ -2632,7 +2632,7 @@
           <a:lstStyle/>
           <a:p>
             <a:r>
-              <a:rPr lang="en-US" smtClean="0"/>
+              <a:rPr lang="en-US"/>
               <a:t>Click to edit Master title style</a:t>
             </a:r>
             <a:endParaRPr lang="en-SG"/>
@@ -2666,35 +2666,35 @@
           <a:p>
             <a:pPr lvl="0"/>
             <a:r>
-              <a:rPr lang="en-US" smtClean="0"/>
+              <a:rPr lang="en-US"/>
               <a:t>Click to edit Master text styles</a:t>
             </a:r>
           </a:p>
           <a:p>
             <a:pPr lvl="1"/>
             <a:r>
-              <a:rPr lang="en-US" smtClean="0"/>
+              <a:rPr lang="en-US"/>
               <a:t>Second level</a:t>
             </a:r>
           </a:p>
           <a:p>
             <a:pPr lvl="2"/>
             <a:r>
-              <a:rPr lang="en-US" smtClean="0"/>
+              <a:rPr lang="en-US"/>
               <a:t>Third level</a:t>
             </a:r>
           </a:p>
           <a:p>
             <a:pPr lvl="3"/>
             <a:r>
-              <a:rPr lang="en-US" smtClean="0"/>
+              <a:rPr lang="en-US"/>
               <a:t>Fourth level</a:t>
             </a:r>
           </a:p>
           <a:p>
             <a:pPr lvl="4"/>
             <a:r>
-              <a:rPr lang="en-US" smtClean="0"/>
+              <a:rPr lang="en-US"/>
               <a:t>Fifth level</a:t>
             </a:r>
             <a:endParaRPr lang="en-SG"/>
@@ -2736,7 +2736,7 @@
           <a:p>
             <a:fld id="{A0F86979-30DA-49EE-A740-32EBA6D2B7DE}" type="datetimeFigureOut">
               <a:rPr lang="en-SG" smtClean="0"/>
-              <a:t>19/11/2017</a:t>
+              <a:t>8/2/2024</a:t>
             </a:fld>
             <a:endParaRPr lang="en-SG"/>
           </a:p>
@@ -3203,7 +3203,7 @@
               <a:defRPr/>
             </a:pPr>
             <a:r>
-              <a:rPr kumimoji="0" lang="en-US" sz="1800" b="0" i="0" u="none" strike="noStrike" kern="0" cap="none" spc="0" normalizeH="0" baseline="0" noProof="0" dirty="0" err="1" smtClean="0">
+              <a:rPr kumimoji="0" lang="en-US" sz="1800" b="0" i="0" u="none" strike="noStrike" kern="0" cap="none" spc="0" normalizeH="0" baseline="0" noProof="0" dirty="0" err="1">
                 <a:ln>
                   <a:noFill/>
                 </a:ln>
@@ -3217,7 +3217,7 @@
               </a:rPr>
               <a:t>SquareGame</a:t>
             </a:r>
-            <a:endParaRPr kumimoji="0" lang="en-US" sz="1800" b="1" i="0" u="none" strike="noStrike" kern="0" cap="none" spc="0" normalizeH="0" baseline="0" noProof="0" dirty="0" smtClean="0">
+            <a:endParaRPr kumimoji="0" lang="en-US" sz="1800" b="1" i="0" u="none" strike="noStrike" kern="0" cap="none" spc="0" normalizeH="0" baseline="0" noProof="0" dirty="0">
               <a:ln>
                 <a:noFill/>
               </a:ln>
@@ -3293,7 +3293,7 @@
               <a:defRPr/>
             </a:pPr>
             <a:r>
-              <a:rPr kumimoji="0" lang="en-US" sz="1800" b="0" i="0" u="none" strike="noStrike" kern="0" cap="none" spc="0" normalizeH="0" baseline="0" noProof="0" dirty="0" smtClean="0">
+              <a:rPr kumimoji="0" lang="en-US" sz="1800" b="0" i="0" u="none" strike="noStrike" kern="0" cap="none" spc="0" normalizeH="0" baseline="0" noProof="0" dirty="0">
                 <a:ln>
                   <a:noFill/>
                 </a:ln>
@@ -3307,18 +3307,6 @@
               </a:rPr>
               <a:t>Player</a:t>
             </a:r>
-            <a:endParaRPr kumimoji="0" lang="en-US" sz="1800" b="0" i="0" u="none" strike="noStrike" kern="0" cap="none" spc="0" normalizeH="0" baseline="0" noProof="0" dirty="0">
-              <a:ln>
-                <a:noFill/>
-              </a:ln>
-              <a:solidFill>
-                <a:sysClr val="windowText" lastClr="000000"/>
-              </a:solidFill>
-              <a:effectLst/>
-              <a:uLnTx/>
-              <a:uFillTx/>
-              <a:latin typeface="Calibri" pitchFamily="34" charset="0"/>
-            </a:endParaRPr>
           </a:p>
         </p:txBody>
       </p:sp>
@@ -3389,7 +3377,7 @@
               <a:defRPr/>
             </a:pPr>
             <a:r>
-              <a:rPr kumimoji="0" lang="en-US" sz="1800" b="0" i="0" u="none" strike="noStrike" kern="0" cap="none" spc="0" normalizeH="0" baseline="0" noProof="0" dirty="0" smtClean="0">
+              <a:rPr kumimoji="0" lang="en-US" sz="1800" b="0" i="0" u="none" strike="noStrike" kern="0" cap="none" spc="0" normalizeH="0" baseline="0" noProof="0" dirty="0">
                 <a:ln>
                   <a:noFill/>
                 </a:ln>
@@ -3403,18 +3391,6 @@
               </a:rPr>
               <a:t>plays</a:t>
             </a:r>
-            <a:endParaRPr kumimoji="0" lang="en-US" sz="1800" b="0" i="0" u="none" strike="noStrike" kern="0" cap="none" spc="0" normalizeH="0" baseline="0" noProof="0" dirty="0">
-              <a:ln>
-                <a:noFill/>
-              </a:ln>
-              <a:solidFill>
-                <a:sysClr val="windowText" lastClr="000000"/>
-              </a:solidFill>
-              <a:effectLst/>
-              <a:uLnTx/>
-              <a:uFillTx/>
-              <a:latin typeface="Calibri" pitchFamily="34" charset="0"/>
-            </a:endParaRPr>
           </a:p>
         </p:txBody>
       </p:sp>
@@ -3479,7 +3455,7 @@
               <a:defRPr/>
             </a:pPr>
             <a:r>
-              <a:rPr kumimoji="0" lang="en-US" sz="1800" b="0" i="0" u="none" strike="noStrike" kern="0" cap="none" spc="0" normalizeH="0" baseline="0" noProof="0" dirty="0" smtClean="0">
+              <a:rPr kumimoji="0" lang="en-US" sz="1800" b="0" i="0" u="none" strike="noStrike" kern="0" cap="none" spc="0" normalizeH="0" baseline="0" noProof="0" dirty="0">
                 <a:ln>
                   <a:noFill/>
                 </a:ln>
@@ -3493,18 +3469,6 @@
               </a:rPr>
               <a:t>Piece</a:t>
             </a:r>
-            <a:endParaRPr kumimoji="0" lang="en-US" sz="1800" b="0" i="0" u="none" strike="noStrike" kern="0" cap="none" spc="0" normalizeH="0" baseline="0" noProof="0" dirty="0">
-              <a:ln>
-                <a:noFill/>
-              </a:ln>
-              <a:solidFill>
-                <a:sysClr val="windowText" lastClr="000000"/>
-              </a:solidFill>
-              <a:effectLst/>
-              <a:uLnTx/>
-              <a:uFillTx/>
-              <a:latin typeface="Calibri" pitchFamily="34" charset="0"/>
-            </a:endParaRPr>
           </a:p>
         </p:txBody>
       </p:sp>
@@ -3586,7 +3550,7 @@
               <a:defRPr/>
             </a:pPr>
             <a:r>
-              <a:rPr kumimoji="0" lang="en-US" sz="1800" b="0" i="0" u="none" strike="noStrike" kern="0" cap="none" spc="0" normalizeH="0" baseline="0" noProof="0" dirty="0" smtClean="0">
+              <a:rPr kumimoji="0" lang="en-US" sz="1800" b="0" i="0" u="none" strike="noStrike" kern="0" cap="none" spc="0" normalizeH="0" baseline="0" noProof="0" dirty="0">
                 <a:ln>
                   <a:noFill/>
                 </a:ln>
@@ -3600,18 +3564,6 @@
               </a:rPr>
               <a:t>Board</a:t>
             </a:r>
-            <a:endParaRPr kumimoji="0" lang="en-US" sz="1800" b="0" i="0" u="none" strike="noStrike" kern="0" cap="none" spc="0" normalizeH="0" baseline="0" noProof="0" dirty="0">
-              <a:ln>
-                <a:noFill/>
-              </a:ln>
-              <a:solidFill>
-                <a:sysClr val="windowText" lastClr="000000"/>
-              </a:solidFill>
-              <a:effectLst/>
-              <a:uLnTx/>
-              <a:uFillTx/>
-              <a:latin typeface="Calibri" pitchFamily="34" charset="0"/>
-            </a:endParaRPr>
           </a:p>
         </p:txBody>
       </p:sp>
@@ -3693,7 +3645,7 @@
               <a:defRPr/>
             </a:pPr>
             <a:r>
-              <a:rPr kumimoji="0" lang="en-US" sz="1800" b="0" i="0" u="none" strike="noStrike" kern="0" cap="none" spc="0" normalizeH="0" baseline="0" noProof="0" dirty="0" smtClean="0">
+              <a:rPr kumimoji="0" lang="en-US" sz="1800" b="0" i="0" u="none" strike="noStrike" kern="0" cap="none" spc="0" normalizeH="0" baseline="0" noProof="0" dirty="0">
                 <a:ln>
                   <a:noFill/>
                 </a:ln>
@@ -3707,18 +3659,6 @@
               </a:rPr>
               <a:t>Square</a:t>
             </a:r>
-            <a:endParaRPr kumimoji="0" lang="en-US" sz="1800" b="0" i="0" u="none" strike="noStrike" kern="0" cap="none" spc="0" normalizeH="0" baseline="0" noProof="0" dirty="0">
-              <a:ln>
-                <a:noFill/>
-              </a:ln>
-              <a:solidFill>
-                <a:sysClr val="windowText" lastClr="000000"/>
-              </a:solidFill>
-              <a:effectLst/>
-              <a:uLnTx/>
-              <a:uFillTx/>
-              <a:latin typeface="Calibri" pitchFamily="34" charset="0"/>
-            </a:endParaRPr>
           </a:p>
         </p:txBody>
       </p:sp>
@@ -3912,7 +3852,7 @@
               <a:defRPr/>
             </a:pPr>
             <a:r>
-              <a:rPr kumimoji="0" lang="en-US" sz="1800" b="0" i="0" u="none" strike="noStrike" kern="0" cap="none" spc="0" normalizeH="0" baseline="0" noProof="0" dirty="0" smtClean="0">
+              <a:rPr kumimoji="0" lang="en-US" sz="1800" b="0" i="0" u="none" strike="noStrike" kern="0" cap="none" spc="0" normalizeH="0" baseline="0" noProof="0" dirty="0">
                 <a:ln>
                   <a:noFill/>
                 </a:ln>
@@ -3926,18 +3866,6 @@
               </a:rPr>
               <a:t>number</a:t>
             </a:r>
-            <a:endParaRPr kumimoji="0" lang="en-US" sz="1800" b="0" i="0" u="none" strike="noStrike" kern="0" cap="none" spc="0" normalizeH="0" baseline="0" noProof="0" dirty="0">
-              <a:ln>
-                <a:noFill/>
-              </a:ln>
-              <a:solidFill>
-                <a:sysClr val="windowText" lastClr="000000"/>
-              </a:solidFill>
-              <a:effectLst/>
-              <a:uLnTx/>
-              <a:uFillTx/>
-              <a:latin typeface="Calibri" pitchFamily="34" charset="0"/>
-            </a:endParaRPr>
           </a:p>
         </p:txBody>
       </p:sp>
@@ -3981,7 +3909,7 @@
               <a:defRPr/>
             </a:pPr>
             <a:r>
-              <a:rPr kumimoji="0" lang="en-US" sz="1800" b="0" i="0" u="none" strike="noStrike" kern="0" cap="none" spc="0" normalizeH="0" baseline="0" noProof="0" dirty="0" smtClean="0">
+              <a:rPr kumimoji="0" lang="en-US" sz="1800" b="0" i="0" u="none" strike="noStrike" kern="0" cap="none" spc="0" normalizeH="0" baseline="0" noProof="0" dirty="0">
                 <a:ln>
                   <a:noFill/>
                 </a:ln>
@@ -3995,31 +3923,19 @@
               </a:rPr>
               <a:t>owns</a:t>
             </a:r>
-            <a:endParaRPr kumimoji="0" lang="en-US" sz="1800" b="0" i="0" u="none" strike="noStrike" kern="0" cap="none" spc="0" normalizeH="0" baseline="0" noProof="0" dirty="0">
-              <a:ln>
-                <a:noFill/>
-              </a:ln>
-              <a:solidFill>
-                <a:sysClr val="windowText" lastClr="000000"/>
-              </a:solidFill>
-              <a:effectLst/>
-              <a:uLnTx/>
-              <a:uFillTx/>
-              <a:latin typeface="Calibri" pitchFamily="34" charset="0"/>
-            </a:endParaRPr>
-          </a:p>
-        </p:txBody>
-      </p:sp>
-      <p:sp>
-        <p:nvSpPr>
-          <p:cNvPr id="127" name="TextBox 126"/>
+          </a:p>
+        </p:txBody>
+      </p:sp>
+      <p:sp>
+        <p:nvSpPr>
+          <p:cNvPr id="129" name="TextBox 128"/>
           <p:cNvSpPr txBox="1"/>
           <p:nvPr/>
         </p:nvSpPr>
         <p:spPr>
           <a:xfrm rot="16200000">
-            <a:off x="345841" y="2544128"/>
-            <a:ext cx="1371600" cy="369332"/>
+            <a:off x="1726217" y="3351515"/>
+            <a:ext cx="978931" cy="369332"/>
           </a:xfrm>
           <a:prstGeom prst="rect">
             <a:avLst/>
@@ -4050,12 +3966,12 @@
               <a:defRPr/>
             </a:pPr>
             <a:r>
-              <a:rPr kumimoji="0" lang="en-US" sz="1800" b="0" i="0" u="none" strike="noStrike" kern="0" cap="none" spc="0" normalizeH="0" baseline="0" noProof="0" dirty="0" smtClean="0">
+              <a:rPr kumimoji="0" lang="en-US" sz="1800" i="0" u="none" strike="noStrike" kern="0" cap="none" spc="0" normalizeH="0" baseline="0" noProof="0" dirty="0">
                 <a:ln>
                   <a:noFill/>
                 </a:ln>
                 <a:solidFill>
-                  <a:sysClr val="windowText" lastClr="000000"/>
+                  <a:srgbClr val="FF0000"/>
                 </a:solidFill>
                 <a:effectLst/>
                 <a:uLnTx/>
@@ -4065,35 +3981,35 @@
               <a:t> </a:t>
             </a:r>
             <a:r>
-              <a:rPr lang="en-US" b="1" kern="0" dirty="0" smtClean="0">
+              <a:rPr lang="en-US" kern="0" dirty="0">
                 <a:solidFill>
-                  <a:sysClr val="windowText" lastClr="000000"/>
+                  <a:srgbClr val="FF0000"/>
                 </a:solidFill>
                 <a:latin typeface="Calibri" pitchFamily="34" charset="0"/>
               </a:rPr>
               <a:t>  </a:t>
             </a:r>
             <a:r>
-              <a:rPr kumimoji="0" lang="en-US" sz="1800" b="0" i="0" u="none" strike="noStrike" kern="0" cap="none" spc="0" normalizeH="0" baseline="0" noProof="0" dirty="0" smtClean="0">
+              <a:rPr kumimoji="0" lang="en-US" sz="1800" i="0" u="none" strike="noStrike" kern="0" cap="none" spc="0" normalizeH="0" baseline="0" noProof="0" dirty="0" err="1">
                 <a:ln>
                   <a:noFill/>
                 </a:ln>
                 <a:solidFill>
-                  <a:sysClr val="windowText" lastClr="000000"/>
+                  <a:srgbClr val="FF0000"/>
                 </a:solidFill>
                 <a:effectLst/>
                 <a:uLnTx/>
                 <a:uFillTx/>
                 <a:latin typeface="Calibri" pitchFamily="34" charset="0"/>
               </a:rPr>
-              <a:t>played on</a:t>
-            </a:r>
-            <a:endParaRPr kumimoji="0" lang="en-US" sz="1800" b="0" i="0" u="none" strike="noStrike" kern="0" cap="none" spc="0" normalizeH="0" baseline="0" noProof="0" dirty="0">
+              <a:t>isOn</a:t>
+            </a:r>
+            <a:endParaRPr kumimoji="0" lang="en-US" sz="1800" i="0" u="none" strike="noStrike" kern="0" cap="none" spc="0" normalizeH="0" baseline="0" noProof="0" dirty="0">
               <a:ln>
                 <a:noFill/>
               </a:ln>
               <a:solidFill>
-                <a:sysClr val="windowText" lastClr="000000"/>
+                <a:srgbClr val="FF0000"/>
               </a:solidFill>
               <a:effectLst/>
               <a:uLnTx/>
@@ -4105,14 +4021,14 @@
       </p:sp>
       <p:sp>
         <p:nvSpPr>
-          <p:cNvPr id="129" name="TextBox 128"/>
+          <p:cNvPr id="130" name="TextBox 129"/>
           <p:cNvSpPr txBox="1"/>
           <p:nvPr/>
         </p:nvSpPr>
         <p:spPr>
-          <a:xfrm rot="16200000">
-            <a:off x="1726217" y="3351515"/>
-            <a:ext cx="978931" cy="369332"/>
+          <a:xfrm>
+            <a:off x="3837112" y="1729264"/>
+            <a:ext cx="609600" cy="369332"/>
           </a:xfrm>
           <a:prstGeom prst="rect">
             <a:avLst/>
@@ -4143,69 +4059,33 @@
               <a:defRPr/>
             </a:pPr>
             <a:r>
-              <a:rPr kumimoji="0" lang="en-US" sz="1800" i="0" u="none" strike="noStrike" kern="0" cap="none" spc="0" normalizeH="0" baseline="0" noProof="0" dirty="0" smtClean="0">
+              <a:rPr kumimoji="0" lang="en-US" sz="1800" b="0" i="0" u="none" strike="noStrike" kern="0" cap="none" spc="0" normalizeH="0" baseline="0" noProof="0" dirty="0">
                 <a:ln>
                   <a:noFill/>
                 </a:ln>
                 <a:solidFill>
-                  <a:srgbClr val="FF0000"/>
+                  <a:sysClr val="windowText" lastClr="000000"/>
                 </a:solidFill>
                 <a:effectLst/>
                 <a:uLnTx/>
                 <a:uFillTx/>
                 <a:latin typeface="Calibri" pitchFamily="34" charset="0"/>
               </a:rPr>
-              <a:t> </a:t>
-            </a:r>
-            <a:r>
-              <a:rPr lang="en-US" kern="0" dirty="0" smtClean="0">
-                <a:solidFill>
-                  <a:srgbClr val="FF0000"/>
-                </a:solidFill>
-                <a:latin typeface="Calibri" pitchFamily="34" charset="0"/>
-              </a:rPr>
-              <a:t>  </a:t>
-            </a:r>
-            <a:r>
-              <a:rPr kumimoji="0" lang="en-US" sz="1800" i="0" u="none" strike="noStrike" kern="0" cap="none" spc="0" normalizeH="0" baseline="0" noProof="0" dirty="0" err="1" smtClean="0">
-                <a:ln>
-                  <a:noFill/>
-                </a:ln>
-                <a:solidFill>
-                  <a:srgbClr val="FF0000"/>
-                </a:solidFill>
-                <a:effectLst/>
-                <a:uLnTx/>
-                <a:uFillTx/>
-                <a:latin typeface="Calibri" pitchFamily="34" charset="0"/>
-              </a:rPr>
-              <a:t>isOn</a:t>
-            </a:r>
-            <a:endParaRPr kumimoji="0" lang="en-US" sz="1800" i="0" u="none" strike="noStrike" kern="0" cap="none" spc="0" normalizeH="0" baseline="0" noProof="0" dirty="0">
-              <a:ln>
-                <a:noFill/>
-              </a:ln>
-              <a:solidFill>
-                <a:srgbClr val="FF0000"/>
-              </a:solidFill>
-              <a:effectLst/>
-              <a:uLnTx/>
-              <a:uFillTx/>
-              <a:latin typeface="Calibri" pitchFamily="34" charset="0"/>
-            </a:endParaRPr>
-          </a:p>
-        </p:txBody>
-      </p:sp>
-      <p:sp>
-        <p:nvSpPr>
-          <p:cNvPr id="130" name="TextBox 129"/>
+              <a:t> 2..*</a:t>
+            </a:r>
+          </a:p>
+        </p:txBody>
+      </p:sp>
+      <p:sp>
+        <p:nvSpPr>
+          <p:cNvPr id="131" name="TextBox 130"/>
           <p:cNvSpPr txBox="1"/>
           <p:nvPr/>
         </p:nvSpPr>
         <p:spPr>
           <a:xfrm>
-            <a:off x="3837112" y="1729264"/>
-            <a:ext cx="609600" cy="369332"/>
+            <a:off x="3474265" y="1972628"/>
+            <a:ext cx="381000" cy="381000"/>
           </a:xfrm>
           <a:prstGeom prst="rect">
             <a:avLst/>
@@ -4236,7 +4116,7 @@
               <a:defRPr/>
             </a:pPr>
             <a:r>
-              <a:rPr kumimoji="0" lang="en-US" sz="1800" b="0" i="0" u="none" strike="noStrike" kern="0" cap="none" spc="0" normalizeH="0" baseline="0" noProof="0" dirty="0" smtClean="0">
+              <a:rPr kumimoji="0" lang="en-US" sz="1800" b="0" i="0" u="none" strike="noStrike" kern="0" cap="none" spc="0" normalizeH="0" baseline="0" noProof="0" dirty="0">
                 <a:ln>
                   <a:noFill/>
                 </a:ln>
@@ -4248,32 +4128,20 @@
                 <a:uFillTx/>
                 <a:latin typeface="Calibri" pitchFamily="34" charset="0"/>
               </a:rPr>
-              <a:t> 2..*</a:t>
-            </a:r>
-            <a:endParaRPr kumimoji="0" lang="en-US" sz="1800" b="0" i="0" u="none" strike="noStrike" kern="0" cap="none" spc="0" normalizeH="0" baseline="0" noProof="0" dirty="0">
-              <a:ln>
-                <a:noFill/>
-              </a:ln>
-              <a:solidFill>
-                <a:sysClr val="windowText" lastClr="000000"/>
-              </a:solidFill>
-              <a:effectLst/>
-              <a:uLnTx/>
-              <a:uFillTx/>
-              <a:latin typeface="Calibri" pitchFamily="34" charset="0"/>
-            </a:endParaRPr>
-          </a:p>
-        </p:txBody>
-      </p:sp>
-      <p:sp>
-        <p:nvSpPr>
-          <p:cNvPr id="131" name="TextBox 130"/>
+              <a:t> 1</a:t>
+            </a:r>
+          </a:p>
+        </p:txBody>
+      </p:sp>
+      <p:sp>
+        <p:nvSpPr>
+          <p:cNvPr id="132" name="TextBox 131"/>
           <p:cNvSpPr txBox="1"/>
           <p:nvPr/>
         </p:nvSpPr>
         <p:spPr>
           <a:xfrm>
-            <a:off x="3474265" y="1972628"/>
+            <a:off x="2389312" y="2872264"/>
             <a:ext cx="381000" cy="381000"/>
           </a:xfrm>
           <a:prstGeom prst="rect">
@@ -4305,76 +4173,7 @@
               <a:defRPr/>
             </a:pPr>
             <a:r>
-              <a:rPr kumimoji="0" lang="en-US" sz="1800" b="0" i="0" u="none" strike="noStrike" kern="0" cap="none" spc="0" normalizeH="0" baseline="0" noProof="0" dirty="0" smtClean="0">
-                <a:ln>
-                  <a:noFill/>
-                </a:ln>
-                <a:solidFill>
-                  <a:sysClr val="windowText" lastClr="000000"/>
-                </a:solidFill>
-                <a:effectLst/>
-                <a:uLnTx/>
-                <a:uFillTx/>
-                <a:latin typeface="Calibri" pitchFamily="34" charset="0"/>
-              </a:rPr>
-              <a:t> 1</a:t>
-            </a:r>
-            <a:endParaRPr kumimoji="0" lang="en-US" sz="1800" b="0" i="0" u="none" strike="noStrike" kern="0" cap="none" spc="0" normalizeH="0" baseline="0" noProof="0" dirty="0">
-              <a:ln>
-                <a:noFill/>
-              </a:ln>
-              <a:solidFill>
-                <a:sysClr val="windowText" lastClr="000000"/>
-              </a:solidFill>
-              <a:effectLst/>
-              <a:uLnTx/>
-              <a:uFillTx/>
-              <a:latin typeface="Calibri" pitchFamily="34" charset="0"/>
-            </a:endParaRPr>
-          </a:p>
-        </p:txBody>
-      </p:sp>
-      <p:sp>
-        <p:nvSpPr>
-          <p:cNvPr id="132" name="TextBox 131"/>
-          <p:cNvSpPr txBox="1"/>
-          <p:nvPr/>
-        </p:nvSpPr>
-        <p:spPr>
-          <a:xfrm>
-            <a:off x="2389312" y="2872264"/>
-            <a:ext cx="381000" cy="381000"/>
-          </a:xfrm>
-          <a:prstGeom prst="rect">
-            <a:avLst/>
-          </a:prstGeom>
-          <a:noFill/>
-        </p:spPr>
-        <p:txBody>
-          <a:bodyPr wrap="square" rtlCol="0">
-            <a:spAutoFit/>
-          </a:bodyPr>
-          <a:lstStyle/>
-          <a:p>
-            <a:pPr marL="0" marR="0" lvl="0" indent="0" defTabSz="914400" eaLnBrk="1" fontAlgn="auto" latinLnBrk="0" hangingPunct="1">
-              <a:lnSpc>
-                <a:spcPct val="100000"/>
-              </a:lnSpc>
-              <a:spcBef>
-                <a:spcPts val="0"/>
-              </a:spcBef>
-              <a:spcAft>
-                <a:spcPts val="0"/>
-              </a:spcAft>
-              <a:buClrTx/>
-              <a:buSzTx/>
-              <a:buFontTx/>
-              <a:buNone/>
-              <a:tabLst/>
-              <a:defRPr/>
-            </a:pPr>
-            <a:r>
-              <a:rPr kumimoji="0" lang="en-US" sz="1800" b="1" i="0" u="none" strike="noStrike" kern="0" cap="none" spc="0" normalizeH="0" baseline="0" noProof="0" dirty="0" smtClean="0">
+              <a:rPr kumimoji="0" lang="en-US" sz="1800" b="1" i="0" u="none" strike="noStrike" kern="0" cap="none" spc="0" normalizeH="0" baseline="0" noProof="0" dirty="0">
                 <a:ln>
                   <a:noFill/>
                 </a:ln>
@@ -4385,15 +4184,6 @@
               </a:rPr>
               <a:t> *</a:t>
             </a:r>
-            <a:endParaRPr kumimoji="0" lang="en-US" sz="1800" b="1" i="0" u="none" strike="noStrike" kern="0" cap="none" spc="0" normalizeH="0" baseline="0" noProof="0" dirty="0">
-              <a:ln>
-                <a:noFill/>
-              </a:ln>
-              <a:effectLst/>
-              <a:uLnTx/>
-              <a:uFillTx/>
-              <a:latin typeface="Calibri" pitchFamily="34" charset="0"/>
-            </a:endParaRPr>
           </a:p>
         </p:txBody>
       </p:sp>
@@ -4451,7 +4241,7 @@
               <a:defRPr/>
             </a:pPr>
             <a:r>
-              <a:rPr kumimoji="0" lang="en-US" sz="1800" b="0" i="0" u="none" strike="noStrike" kern="0" cap="none" spc="0" normalizeH="0" baseline="0" noProof="0" dirty="0" err="1" smtClean="0">
+              <a:rPr kumimoji="0" lang="en-US" sz="1800" b="0" i="0" u="none" strike="noStrike" kern="0" cap="none" spc="0" normalizeH="0" baseline="0" noProof="0" dirty="0" err="1">
                 <a:ln>
                   <a:noFill/>
                 </a:ln>
@@ -4465,7 +4255,7 @@
               </a:rPr>
               <a:t>SquareGame</a:t>
             </a:r>
-            <a:endParaRPr kumimoji="0" lang="en-US" sz="1800" b="1" i="0" u="none" strike="noStrike" kern="0" cap="none" spc="0" normalizeH="0" baseline="0" noProof="0" dirty="0" smtClean="0">
+            <a:endParaRPr kumimoji="0" lang="en-US" sz="1800" b="1" i="0" u="none" strike="noStrike" kern="0" cap="none" spc="0" normalizeH="0" baseline="0" noProof="0" dirty="0">
               <a:ln>
                 <a:noFill/>
               </a:ln>
@@ -4541,7 +4331,7 @@
               <a:defRPr/>
             </a:pPr>
             <a:r>
-              <a:rPr kumimoji="0" lang="en-US" sz="1800" b="0" i="0" u="none" strike="noStrike" kern="0" cap="none" spc="0" normalizeH="0" baseline="0" noProof="0" dirty="0" smtClean="0">
+              <a:rPr kumimoji="0" lang="en-US" sz="1800" b="0" i="0" u="none" strike="noStrike" kern="0" cap="none" spc="0" normalizeH="0" baseline="0" noProof="0" dirty="0">
                 <a:ln>
                   <a:noFill/>
                 </a:ln>
@@ -4555,18 +4345,6 @@
               </a:rPr>
               <a:t>Player</a:t>
             </a:r>
-            <a:endParaRPr kumimoji="0" lang="en-US" sz="1800" b="0" i="0" u="none" strike="noStrike" kern="0" cap="none" spc="0" normalizeH="0" baseline="0" noProof="0" dirty="0">
-              <a:ln>
-                <a:noFill/>
-              </a:ln>
-              <a:solidFill>
-                <a:sysClr val="windowText" lastClr="000000"/>
-              </a:solidFill>
-              <a:effectLst/>
-              <a:uLnTx/>
-              <a:uFillTx/>
-              <a:latin typeface="Calibri" pitchFamily="34" charset="0"/>
-            </a:endParaRPr>
           </a:p>
         </p:txBody>
       </p:sp>
@@ -4637,7 +4415,7 @@
               <a:defRPr/>
             </a:pPr>
             <a:r>
-              <a:rPr kumimoji="0" lang="en-US" sz="1800" b="0" i="0" u="none" strike="noStrike" kern="0" cap="none" spc="0" normalizeH="0" baseline="0" noProof="0" dirty="0" smtClean="0">
+              <a:rPr kumimoji="0" lang="en-US" sz="1800" b="0" i="0" u="none" strike="noStrike" kern="0" cap="none" spc="0" normalizeH="0" baseline="0" noProof="0" dirty="0">
                 <a:ln>
                   <a:noFill/>
                 </a:ln>
@@ -4651,18 +4429,6 @@
               </a:rPr>
               <a:t>  plays</a:t>
             </a:r>
-            <a:endParaRPr kumimoji="0" lang="en-US" sz="1800" b="0" i="0" u="none" strike="noStrike" kern="0" cap="none" spc="0" normalizeH="0" baseline="0" noProof="0" dirty="0">
-              <a:ln>
-                <a:noFill/>
-              </a:ln>
-              <a:solidFill>
-                <a:sysClr val="windowText" lastClr="000000"/>
-              </a:solidFill>
-              <a:effectLst/>
-              <a:uLnTx/>
-              <a:uFillTx/>
-              <a:latin typeface="Calibri" pitchFamily="34" charset="0"/>
-            </a:endParaRPr>
           </a:p>
         </p:txBody>
       </p:sp>
@@ -4727,7 +4493,7 @@
               <a:defRPr/>
             </a:pPr>
             <a:r>
-              <a:rPr kumimoji="0" lang="en-US" sz="1800" b="0" i="0" u="none" strike="noStrike" kern="0" cap="none" spc="0" normalizeH="0" baseline="0" noProof="0" dirty="0" smtClean="0">
+              <a:rPr kumimoji="0" lang="en-US" sz="1800" b="0" i="0" u="none" strike="noStrike" kern="0" cap="none" spc="0" normalizeH="0" baseline="0" noProof="0" dirty="0">
                 <a:ln>
                   <a:noFill/>
                 </a:ln>
@@ -4741,18 +4507,6 @@
               </a:rPr>
               <a:t>Piece</a:t>
             </a:r>
-            <a:endParaRPr kumimoji="0" lang="en-US" sz="1800" b="0" i="0" u="none" strike="noStrike" kern="0" cap="none" spc="0" normalizeH="0" baseline="0" noProof="0" dirty="0">
-              <a:ln>
-                <a:noFill/>
-              </a:ln>
-              <a:solidFill>
-                <a:sysClr val="windowText" lastClr="000000"/>
-              </a:solidFill>
-              <a:effectLst/>
-              <a:uLnTx/>
-              <a:uFillTx/>
-              <a:latin typeface="Calibri" pitchFamily="34" charset="0"/>
-            </a:endParaRPr>
           </a:p>
         </p:txBody>
       </p:sp>
@@ -4834,7 +4588,7 @@
               <a:defRPr/>
             </a:pPr>
             <a:r>
-              <a:rPr kumimoji="0" lang="en-US" sz="1800" b="0" i="0" u="none" strike="noStrike" kern="0" cap="none" spc="0" normalizeH="0" baseline="0" noProof="0" dirty="0" smtClean="0">
+              <a:rPr kumimoji="0" lang="en-US" sz="1800" b="0" i="0" u="none" strike="noStrike" kern="0" cap="none" spc="0" normalizeH="0" baseline="0" noProof="0" dirty="0">
                 <a:ln>
                   <a:noFill/>
                 </a:ln>
@@ -4848,18 +4602,6 @@
               </a:rPr>
               <a:t>Board</a:t>
             </a:r>
-            <a:endParaRPr kumimoji="0" lang="en-US" sz="1800" b="0" i="0" u="none" strike="noStrike" kern="0" cap="none" spc="0" normalizeH="0" baseline="0" noProof="0" dirty="0">
-              <a:ln>
-                <a:noFill/>
-              </a:ln>
-              <a:solidFill>
-                <a:sysClr val="windowText" lastClr="000000"/>
-              </a:solidFill>
-              <a:effectLst/>
-              <a:uLnTx/>
-              <a:uFillTx/>
-              <a:latin typeface="Calibri" pitchFamily="34" charset="0"/>
-            </a:endParaRPr>
           </a:p>
         </p:txBody>
       </p:sp>
@@ -4941,7 +4683,7 @@
               <a:defRPr/>
             </a:pPr>
             <a:r>
-              <a:rPr kumimoji="0" lang="en-US" sz="1800" b="0" i="0" u="none" strike="noStrike" kern="0" cap="none" spc="0" normalizeH="0" baseline="0" noProof="0" dirty="0" smtClean="0">
+              <a:rPr kumimoji="0" lang="en-US" sz="1800" b="0" i="0" u="none" strike="noStrike" kern="0" cap="none" spc="0" normalizeH="0" baseline="0" noProof="0" dirty="0">
                 <a:ln>
                   <a:noFill/>
                 </a:ln>
@@ -4955,18 +4697,6 @@
               </a:rPr>
               <a:t>Square</a:t>
             </a:r>
-            <a:endParaRPr kumimoji="0" lang="en-US" sz="1800" b="0" i="0" u="none" strike="noStrike" kern="0" cap="none" spc="0" normalizeH="0" baseline="0" noProof="0" dirty="0">
-              <a:ln>
-                <a:noFill/>
-              </a:ln>
-              <a:solidFill>
-                <a:sysClr val="windowText" lastClr="000000"/>
-              </a:solidFill>
-              <a:effectLst/>
-              <a:uLnTx/>
-              <a:uFillTx/>
-              <a:latin typeface="Calibri" pitchFamily="34" charset="0"/>
-            </a:endParaRPr>
           </a:p>
         </p:txBody>
       </p:sp>
@@ -5131,7 +4861,7 @@
               <a:defRPr/>
             </a:pPr>
             <a:r>
-              <a:rPr kumimoji="0" lang="en-US" sz="1800" b="0" i="0" u="none" strike="noStrike" kern="0" cap="none" spc="0" normalizeH="0" baseline="0" noProof="0" dirty="0" smtClean="0">
+              <a:rPr kumimoji="0" lang="en-US" sz="1800" b="0" i="0" u="none" strike="noStrike" kern="0" cap="none" spc="0" normalizeH="0" baseline="0" noProof="0" dirty="0">
                 <a:ln>
                   <a:noFill/>
                 </a:ln>
@@ -5145,18 +4875,6 @@
               </a:rPr>
               <a:t>number</a:t>
             </a:r>
-            <a:endParaRPr kumimoji="0" lang="en-US" sz="1800" b="0" i="0" u="none" strike="noStrike" kern="0" cap="none" spc="0" normalizeH="0" baseline="0" noProof="0" dirty="0">
-              <a:ln>
-                <a:noFill/>
-              </a:ln>
-              <a:solidFill>
-                <a:sysClr val="windowText" lastClr="000000"/>
-              </a:solidFill>
-              <a:effectLst/>
-              <a:uLnTx/>
-              <a:uFillTx/>
-              <a:latin typeface="Calibri" pitchFamily="34" charset="0"/>
-            </a:endParaRPr>
           </a:p>
         </p:txBody>
       </p:sp>
@@ -5200,7 +4918,7 @@
               <a:defRPr/>
             </a:pPr>
             <a:r>
-              <a:rPr kumimoji="0" lang="en-US" sz="1800" b="0" i="0" u="none" strike="noStrike" kern="0" cap="none" spc="0" normalizeH="0" baseline="0" noProof="0" dirty="0" smtClean="0">
+              <a:rPr kumimoji="0" lang="en-US" sz="1800" b="0" i="0" u="none" strike="noStrike" kern="0" cap="none" spc="0" normalizeH="0" baseline="0" noProof="0" dirty="0">
                 <a:ln>
                   <a:noFill/>
                 </a:ln>
@@ -5214,31 +4932,56 @@
               </a:rPr>
               <a:t>  owns</a:t>
             </a:r>
-            <a:endParaRPr kumimoji="0" lang="en-US" sz="1800" b="0" i="0" u="none" strike="noStrike" kern="0" cap="none" spc="0" normalizeH="0" baseline="0" noProof="0" dirty="0">
-              <a:ln>
-                <a:noFill/>
-              </a:ln>
-              <a:solidFill>
-                <a:sysClr val="windowText" lastClr="000000"/>
-              </a:solidFill>
-              <a:effectLst/>
-              <a:uLnTx/>
-              <a:uFillTx/>
-              <a:latin typeface="Calibri" pitchFamily="34" charset="0"/>
-            </a:endParaRPr>
-          </a:p>
-        </p:txBody>
-      </p:sp>
-      <p:sp>
-        <p:nvSpPr>
-          <p:cNvPr id="145" name="TextBox 144"/>
+          </a:p>
+        </p:txBody>
+      </p:sp>
+      <p:sp>
+        <p:nvSpPr>
+          <p:cNvPr id="146" name="TextBox 145"/>
           <p:cNvSpPr txBox="1"/>
           <p:nvPr/>
         </p:nvSpPr>
         <p:spPr>
-          <a:xfrm rot="16200000">
-            <a:off x="5643967" y="2595063"/>
-            <a:ext cx="1371600" cy="369332"/>
+          <a:xfrm>
+            <a:off x="6157041" y="3679898"/>
+            <a:ext cx="554960" cy="369332"/>
+          </a:xfrm>
+          <a:prstGeom prst="rect">
+            <a:avLst/>
+          </a:prstGeom>
+        </p:spPr>
+        <p:txBody>
+          <a:bodyPr wrap="none">
+            <a:spAutoFit/>
+          </a:bodyPr>
+          <a:lstStyle>
+            <a:defPPr>
+              <a:defRPr lang="en-US"/>
+            </a:defPPr>
+            <a:lvl1pPr lvl="0">
+              <a:defRPr kern="0">
+                <a:latin typeface="Calibri" pitchFamily="34" charset="0"/>
+              </a:defRPr>
+            </a:lvl1pPr>
+          </a:lstStyle>
+          <a:p>
+            <a:r>
+              <a:rPr lang="en-US" dirty="0"/>
+              <a:t>       </a:t>
+            </a:r>
+          </a:p>
+        </p:txBody>
+      </p:sp>
+      <p:sp>
+        <p:nvSpPr>
+          <p:cNvPr id="147" name="TextBox 146"/>
+          <p:cNvSpPr txBox="1"/>
+          <p:nvPr/>
+        </p:nvSpPr>
+        <p:spPr>
+          <a:xfrm>
+            <a:off x="9091535" y="1749862"/>
+            <a:ext cx="609600" cy="369332"/>
           </a:xfrm>
           <a:prstGeom prst="rect">
             <a:avLst/>
@@ -5269,7 +5012,7 @@
               <a:defRPr/>
             </a:pPr>
             <a:r>
-              <a:rPr kumimoji="0" lang="en-US" sz="1800" b="0" i="0" u="none" strike="noStrike" kern="0" cap="none" spc="0" normalizeH="0" baseline="0" noProof="0" dirty="0" smtClean="0">
+              <a:rPr kumimoji="0" lang="en-US" sz="1800" b="0" i="0" u="none" strike="noStrike" kern="0" cap="none" spc="0" normalizeH="0" baseline="0" noProof="0" dirty="0">
                 <a:ln>
                   <a:noFill/>
                 </a:ln>
@@ -5281,94 +5024,21 @@
                 <a:uFillTx/>
                 <a:latin typeface="Calibri" pitchFamily="34" charset="0"/>
               </a:rPr>
-              <a:t> </a:t>
-            </a:r>
-            <a:r>
-              <a:rPr lang="en-US" b="1" kern="0" dirty="0" smtClean="0">
-                <a:solidFill>
-                  <a:sysClr val="windowText" lastClr="000000"/>
-                </a:solidFill>
-                <a:latin typeface="Calibri" pitchFamily="34" charset="0"/>
-              </a:rPr>
-              <a:t>  </a:t>
-            </a:r>
-            <a:r>
-              <a:rPr kumimoji="0" lang="en-US" sz="1800" b="0" i="0" u="none" strike="noStrike" kern="0" cap="none" spc="0" normalizeH="0" baseline="0" noProof="0" dirty="0" smtClean="0">
-                <a:ln>
-                  <a:noFill/>
-                </a:ln>
-                <a:solidFill>
-                  <a:sysClr val="windowText" lastClr="000000"/>
-                </a:solidFill>
-                <a:effectLst/>
-                <a:uLnTx/>
-                <a:uFillTx/>
-                <a:latin typeface="Calibri" pitchFamily="34" charset="0"/>
-              </a:rPr>
-              <a:t>played on</a:t>
-            </a:r>
-            <a:endParaRPr kumimoji="0" lang="en-US" sz="1800" b="0" i="0" u="none" strike="noStrike" kern="0" cap="none" spc="0" normalizeH="0" baseline="0" noProof="0" dirty="0">
-              <a:ln>
-                <a:noFill/>
-              </a:ln>
-              <a:solidFill>
-                <a:sysClr val="windowText" lastClr="000000"/>
-              </a:solidFill>
-              <a:effectLst/>
-              <a:uLnTx/>
-              <a:uFillTx/>
-              <a:latin typeface="Calibri" pitchFamily="34" charset="0"/>
-            </a:endParaRPr>
-          </a:p>
-        </p:txBody>
-      </p:sp>
-      <p:sp>
-        <p:nvSpPr>
-          <p:cNvPr id="146" name="TextBox 145"/>
+              <a:t> 2..*</a:t>
+            </a:r>
+          </a:p>
+        </p:txBody>
+      </p:sp>
+      <p:sp>
+        <p:nvSpPr>
+          <p:cNvPr id="148" name="TextBox 147"/>
           <p:cNvSpPr txBox="1"/>
           <p:nvPr/>
         </p:nvSpPr>
         <p:spPr>
           <a:xfrm>
-            <a:off x="6157041" y="3679898"/>
-            <a:ext cx="554960" cy="369332"/>
-          </a:xfrm>
-          <a:prstGeom prst="rect">
-            <a:avLst/>
-          </a:prstGeom>
-        </p:spPr>
-        <p:txBody>
-          <a:bodyPr wrap="none">
-            <a:spAutoFit/>
-          </a:bodyPr>
-          <a:lstStyle>
-            <a:defPPr>
-              <a:defRPr lang="en-US"/>
-            </a:defPPr>
-            <a:lvl1pPr lvl="0">
-              <a:defRPr kern="0">
-                <a:latin typeface="Calibri" pitchFamily="34" charset="0"/>
-              </a:defRPr>
-            </a:lvl1pPr>
-          </a:lstStyle>
-          <a:p>
-            <a:r>
-              <a:rPr lang="en-US" dirty="0"/>
-              <a:t>       </a:t>
-            </a:r>
-          </a:p>
-        </p:txBody>
-      </p:sp>
-      <p:sp>
-        <p:nvSpPr>
-          <p:cNvPr id="147" name="TextBox 146"/>
-          <p:cNvSpPr txBox="1"/>
-          <p:nvPr/>
-        </p:nvSpPr>
-        <p:spPr>
-          <a:xfrm>
-            <a:off x="9091535" y="1749862"/>
-            <a:ext cx="609600" cy="369332"/>
+            <a:off x="8746841" y="1984296"/>
+            <a:ext cx="381000" cy="381000"/>
           </a:xfrm>
           <a:prstGeom prst="rect">
             <a:avLst/>
@@ -5399,76 +5069,7 @@
               <a:defRPr/>
             </a:pPr>
             <a:r>
-              <a:rPr kumimoji="0" lang="en-US" sz="1800" b="0" i="0" u="none" strike="noStrike" kern="0" cap="none" spc="0" normalizeH="0" baseline="0" noProof="0" dirty="0" smtClean="0">
-                <a:ln>
-                  <a:noFill/>
-                </a:ln>
-                <a:solidFill>
-                  <a:sysClr val="windowText" lastClr="000000"/>
-                </a:solidFill>
-                <a:effectLst/>
-                <a:uLnTx/>
-                <a:uFillTx/>
-                <a:latin typeface="Calibri" pitchFamily="34" charset="0"/>
-              </a:rPr>
-              <a:t> 2..*</a:t>
-            </a:r>
-            <a:endParaRPr kumimoji="0" lang="en-US" sz="1800" b="0" i="0" u="none" strike="noStrike" kern="0" cap="none" spc="0" normalizeH="0" baseline="0" noProof="0" dirty="0">
-              <a:ln>
-                <a:noFill/>
-              </a:ln>
-              <a:solidFill>
-                <a:sysClr val="windowText" lastClr="000000"/>
-              </a:solidFill>
-              <a:effectLst/>
-              <a:uLnTx/>
-              <a:uFillTx/>
-              <a:latin typeface="Calibri" pitchFamily="34" charset="0"/>
-            </a:endParaRPr>
-          </a:p>
-        </p:txBody>
-      </p:sp>
-      <p:sp>
-        <p:nvSpPr>
-          <p:cNvPr id="148" name="TextBox 147"/>
-          <p:cNvSpPr txBox="1"/>
-          <p:nvPr/>
-        </p:nvSpPr>
-        <p:spPr>
-          <a:xfrm>
-            <a:off x="8746841" y="1984296"/>
-            <a:ext cx="381000" cy="381000"/>
-          </a:xfrm>
-          <a:prstGeom prst="rect">
-            <a:avLst/>
-          </a:prstGeom>
-          <a:noFill/>
-        </p:spPr>
-        <p:txBody>
-          <a:bodyPr wrap="square" rtlCol="0">
-            <a:spAutoFit/>
-          </a:bodyPr>
-          <a:lstStyle/>
-          <a:p>
-            <a:pPr marL="0" marR="0" lvl="0" indent="0" defTabSz="914400" eaLnBrk="1" fontAlgn="auto" latinLnBrk="0" hangingPunct="1">
-              <a:lnSpc>
-                <a:spcPct val="100000"/>
-              </a:lnSpc>
-              <a:spcBef>
-                <a:spcPts val="0"/>
-              </a:spcBef>
-              <a:spcAft>
-                <a:spcPts val="0"/>
-              </a:spcAft>
-              <a:buClrTx/>
-              <a:buSzTx/>
-              <a:buFontTx/>
-              <a:buNone/>
-              <a:tabLst/>
-              <a:defRPr/>
-            </a:pPr>
-            <a:r>
-              <a:rPr kumimoji="0" lang="en-US" sz="1800" b="0" i="0" u="none" strike="noStrike" kern="0" cap="none" spc="0" normalizeH="0" baseline="0" noProof="0" dirty="0" smtClean="0">
+              <a:rPr kumimoji="0" lang="en-US" sz="1800" b="0" i="0" u="none" strike="noStrike" kern="0" cap="none" spc="0" normalizeH="0" baseline="0" noProof="0" dirty="0">
                 <a:ln>
                   <a:noFill/>
                 </a:ln>
@@ -5482,18 +5083,6 @@
               </a:rPr>
               <a:t> 1</a:t>
             </a:r>
-            <a:endParaRPr kumimoji="0" lang="en-US" sz="1800" b="0" i="0" u="none" strike="noStrike" kern="0" cap="none" spc="0" normalizeH="0" baseline="0" noProof="0" dirty="0">
-              <a:ln>
-                <a:noFill/>
-              </a:ln>
-              <a:solidFill>
-                <a:sysClr val="windowText" lastClr="000000"/>
-              </a:solidFill>
-              <a:effectLst/>
-              <a:uLnTx/>
-              <a:uFillTx/>
-              <a:latin typeface="Calibri" pitchFamily="34" charset="0"/>
-            </a:endParaRPr>
           </a:p>
         </p:txBody>
       </p:sp>
@@ -5555,7 +5144,7 @@
               <a:defRPr/>
             </a:pPr>
             <a:r>
-              <a:rPr kumimoji="0" lang="en-US" sz="1800" b="1" i="0" u="none" strike="noStrike" kern="0" cap="none" spc="0" normalizeH="0" baseline="0" noProof="0" dirty="0" err="1" smtClean="0">
+              <a:rPr kumimoji="0" lang="en-US" sz="1800" b="1" i="0" u="none" strike="noStrike" kern="0" cap="none" spc="0" normalizeH="0" baseline="0" noProof="0" dirty="0" err="1">
                 <a:ln>
                   <a:noFill/>
                 </a:ln>
@@ -5570,7 +5159,7 @@
               <a:t>isOn:Square</a:t>
             </a:r>
             <a:r>
-              <a:rPr kumimoji="0" lang="en-US" sz="1800" b="1" i="0" u="none" strike="noStrike" kern="0" cap="none" spc="0" normalizeH="0" baseline="0" noProof="0" dirty="0" smtClean="0">
+              <a:rPr kumimoji="0" lang="en-US" sz="1800" b="1" i="0" u="none" strike="noStrike" kern="0" cap="none" spc="0" normalizeH="0" baseline="0" noProof="0" dirty="0">
                 <a:ln>
                   <a:noFill/>
                 </a:ln>
@@ -5585,7 +5174,7 @@
               <a:t> =</a:t>
             </a:r>
             <a:r>
-              <a:rPr kumimoji="0" lang="en-US" sz="1800" b="1" i="0" u="none" strike="noStrike" kern="0" cap="none" spc="0" normalizeH="0" noProof="0" dirty="0" smtClean="0">
+              <a:rPr kumimoji="0" lang="en-US" sz="1800" b="1" i="0" u="none" strike="noStrike" kern="0" cap="none" spc="0" normalizeH="0" noProof="0" dirty="0">
                 <a:ln>
                   <a:noFill/>
                 </a:ln>
@@ -5654,7 +5243,7 @@
               <a:defRPr/>
             </a:pPr>
             <a:r>
-              <a:rPr kumimoji="0" lang="en-US" sz="1800" b="1" i="0" u="none" strike="noStrike" kern="0" cap="none" spc="0" normalizeH="0" baseline="0" noProof="0" dirty="0" smtClean="0">
+              <a:rPr kumimoji="0" lang="en-US" sz="1800" b="1" i="0" u="none" strike="noStrike" kern="0" cap="none" spc="0" normalizeH="0" baseline="0" noProof="0" dirty="0">
                 <a:ln>
                   <a:noFill/>
                 </a:ln>
@@ -5668,18 +5257,6 @@
               </a:rPr>
               <a:t>0.. 1</a:t>
             </a:r>
-            <a:endParaRPr kumimoji="0" lang="en-US" sz="1800" b="1" i="0" u="none" strike="noStrike" kern="0" cap="none" spc="0" normalizeH="0" baseline="0" noProof="0" dirty="0">
-              <a:ln>
-                <a:noFill/>
-              </a:ln>
-              <a:solidFill>
-                <a:srgbClr val="FF0000"/>
-              </a:solidFill>
-              <a:effectLst/>
-              <a:uLnTx/>
-              <a:uFillTx/>
-              <a:latin typeface="Calibri" pitchFamily="34" charset="0"/>
-            </a:endParaRPr>
           </a:p>
         </p:txBody>
       </p:sp>
@@ -6026,7 +5603,7 @@
               <a:defRPr/>
             </a:pPr>
             <a:r>
-              <a:rPr kumimoji="0" lang="en-US" sz="1800" b="0" i="0" u="none" strike="noStrike" kern="0" cap="none" spc="0" normalizeH="0" baseline="0" noProof="0" dirty="0" smtClean="0">
+              <a:rPr kumimoji="0" lang="en-US" sz="1800" b="0" i="0" u="none" strike="noStrike" kern="0" cap="none" spc="0" normalizeH="0" baseline="0" noProof="0" dirty="0">
                 <a:ln>
                   <a:noFill/>
                 </a:ln>
@@ -6040,7 +5617,7 @@
               </a:rPr>
               <a:t>     </a:t>
             </a:r>
-            <a:endParaRPr kumimoji="0" lang="en-US" sz="1800" i="0" u="none" strike="noStrike" kern="0" cap="none" spc="0" normalizeH="0" baseline="0" noProof="0" dirty="0" smtClean="0">
+            <a:endParaRPr kumimoji="0" lang="en-US" sz="1800" i="0" u="none" strike="noStrike" kern="0" cap="none" spc="0" normalizeH="0" baseline="0" noProof="0" dirty="0">
               <a:ln>
                 <a:noFill/>
               </a:ln>
@@ -6128,7 +5705,7 @@
               <a:defRPr/>
             </a:pPr>
             <a:r>
-              <a:rPr kumimoji="0" lang="en-US" sz="1800" i="0" u="none" strike="noStrike" kern="0" cap="none" spc="0" normalizeH="0" baseline="0" noProof="0" dirty="0" smtClean="0">
+              <a:rPr kumimoji="0" lang="en-US" sz="1800" i="0" u="none" strike="noStrike" kern="0" cap="none" spc="0" normalizeH="0" baseline="0" noProof="0" dirty="0">
                 <a:ln>
                   <a:noFill/>
                 </a:ln>
@@ -6203,15 +5780,163 @@
           </a:p>
         </p:txBody>
       </p:sp>
-      <p:sp>
-        <p:nvSpPr>
-          <p:cNvPr id="4" name="Isosceles Triangle 3"/>
+      <p:grpSp>
+        <p:nvGrpSpPr>
+          <p:cNvPr id="6" name="Group 5">
+            <a:extLst>
+              <a:ext uri="{FF2B5EF4-FFF2-40B4-BE49-F238E27FC236}">
+                <a16:creationId xmlns:a16="http://schemas.microsoft.com/office/drawing/2014/main" id="{628A5DA0-8910-F9F8-1E2D-DD51BB234497}"/>
+              </a:ext>
+            </a:extLst>
+          </p:cNvPr>
+          <p:cNvGrpSpPr/>
+          <p:nvPr/>
+        </p:nvGrpSpPr>
+        <p:grpSpPr>
+          <a:xfrm>
+            <a:off x="846975" y="1916832"/>
+            <a:ext cx="369332" cy="1371600"/>
+            <a:chOff x="846975" y="1916832"/>
+            <a:chExt cx="369332" cy="1371600"/>
+          </a:xfrm>
+        </p:grpSpPr>
+        <p:sp>
+          <p:nvSpPr>
+            <p:cNvPr id="127" name="TextBox 126"/>
+            <p:cNvSpPr txBox="1"/>
+            <p:nvPr/>
+          </p:nvSpPr>
+          <p:spPr>
+            <a:xfrm rot="16200000">
+              <a:off x="345841" y="2417966"/>
+              <a:ext cx="1371600" cy="369332"/>
+            </a:xfrm>
+            <a:prstGeom prst="rect">
+              <a:avLst/>
+            </a:prstGeom>
+            <a:noFill/>
+          </p:spPr>
+          <p:txBody>
+            <a:bodyPr wrap="square" rtlCol="0">
+              <a:spAutoFit/>
+            </a:bodyPr>
+            <a:lstStyle/>
+            <a:p>
+              <a:pPr marL="0" marR="0" lvl="0" indent="0" defTabSz="914400" eaLnBrk="1" fontAlgn="auto" latinLnBrk="0" hangingPunct="1">
+                <a:lnSpc>
+                  <a:spcPct val="100000"/>
+                </a:lnSpc>
+                <a:spcBef>
+                  <a:spcPts val="0"/>
+                </a:spcBef>
+                <a:spcAft>
+                  <a:spcPts val="0"/>
+                </a:spcAft>
+                <a:buClrTx/>
+                <a:buSzTx/>
+                <a:buFontTx/>
+                <a:buNone/>
+                <a:tabLst/>
+                <a:defRPr/>
+              </a:pPr>
+              <a:r>
+                <a:rPr kumimoji="0" lang="en-US" sz="1800" b="0" i="0" u="none" strike="noStrike" kern="0" cap="none" spc="0" normalizeH="0" baseline="0" noProof="0" dirty="0">
+                  <a:ln>
+                    <a:noFill/>
+                  </a:ln>
+                  <a:solidFill>
+                    <a:sysClr val="windowText" lastClr="000000"/>
+                  </a:solidFill>
+                  <a:effectLst/>
+                  <a:uLnTx/>
+                  <a:uFillTx/>
+                  <a:latin typeface="Calibri" pitchFamily="34" charset="0"/>
+                </a:rPr>
+                <a:t> </a:t>
+              </a:r>
+              <a:r>
+                <a:rPr lang="en-US" b="1" kern="0" dirty="0">
+                  <a:solidFill>
+                    <a:sysClr val="windowText" lastClr="000000"/>
+                  </a:solidFill>
+                  <a:latin typeface="Calibri" pitchFamily="34" charset="0"/>
+                </a:rPr>
+                <a:t>  </a:t>
+              </a:r>
+              <a:r>
+                <a:rPr kumimoji="0" lang="en-US" sz="1800" b="0" i="0" u="none" strike="noStrike" kern="0" cap="none" spc="0" normalizeH="0" baseline="0" noProof="0" dirty="0">
+                  <a:ln>
+                    <a:noFill/>
+                  </a:ln>
+                  <a:solidFill>
+                    <a:sysClr val="windowText" lastClr="000000"/>
+                  </a:solidFill>
+                  <a:effectLst/>
+                  <a:uLnTx/>
+                  <a:uFillTx/>
+                  <a:latin typeface="Calibri" pitchFamily="34" charset="0"/>
+                </a:rPr>
+                <a:t>played on</a:t>
+              </a:r>
+            </a:p>
+          </p:txBody>
+        </p:sp>
+        <p:sp>
+          <p:nvSpPr>
+            <p:cNvPr id="4" name="Isosceles Triangle 3"/>
+            <p:cNvSpPr/>
+            <p:nvPr/>
+          </p:nvSpPr>
+          <p:spPr>
+            <a:xfrm flipV="1">
+              <a:off x="992558" y="3092749"/>
+              <a:ext cx="140324" cy="95843"/>
+            </a:xfrm>
+            <a:prstGeom prst="triangle">
+              <a:avLst/>
+            </a:prstGeom>
+            <a:solidFill>
+              <a:schemeClr val="tx1"/>
+            </a:solidFill>
+            <a:ln>
+              <a:noFill/>
+            </a:ln>
+          </p:spPr>
+          <p:style>
+            <a:lnRef idx="2">
+              <a:schemeClr val="accent1">
+                <a:shade val="50000"/>
+              </a:schemeClr>
+            </a:lnRef>
+            <a:fillRef idx="1">
+              <a:schemeClr val="accent1"/>
+            </a:fillRef>
+            <a:effectRef idx="0">
+              <a:schemeClr val="accent1"/>
+            </a:effectRef>
+            <a:fontRef idx="minor">
+              <a:schemeClr val="lt1"/>
+            </a:fontRef>
+          </p:style>
+          <p:txBody>
+            <a:bodyPr rtlCol="0" anchor="ctr"/>
+            <a:lstStyle/>
+            <a:p>
+              <a:pPr algn="ctr"/>
+              <a:endParaRPr lang="en-US"/>
+            </a:p>
+          </p:txBody>
+        </p:sp>
+      </p:grpSp>
+      <p:sp>
+        <p:nvSpPr>
+          <p:cNvPr id="51" name="Isosceles Triangle 50"/>
           <p:cNvSpPr/>
           <p:nvPr/>
         </p:nvSpPr>
         <p:spPr>
-          <a:xfrm>
-            <a:off x="976062" y="2119194"/>
+          <a:xfrm rot="16200000" flipH="1">
+            <a:off x="2083786" y="1508190"/>
             <a:ext cx="140324" cy="95843"/>
           </a:xfrm>
           <a:prstGeom prst="triangle">
@@ -6251,13 +5976,13 @@
       </p:sp>
       <p:sp>
         <p:nvSpPr>
-          <p:cNvPr id="50" name="Isosceles Triangle 49"/>
+          <p:cNvPr id="53" name="Isosceles Triangle 52"/>
           <p:cNvSpPr/>
           <p:nvPr/>
         </p:nvSpPr>
         <p:spPr>
-          <a:xfrm>
-            <a:off x="6274633" y="2163128"/>
+          <a:xfrm rot="16200000" flipH="1">
+            <a:off x="2558269" y="2115207"/>
             <a:ext cx="140324" cy="95843"/>
           </a:xfrm>
           <a:prstGeom prst="triangle">
@@ -6297,13 +6022,13 @@
       </p:sp>
       <p:sp>
         <p:nvSpPr>
-          <p:cNvPr id="51" name="Isosceles Triangle 50"/>
+          <p:cNvPr id="54" name="Isosceles Triangle 53"/>
           <p:cNvSpPr/>
           <p:nvPr/>
         </p:nvSpPr>
         <p:spPr>
           <a:xfrm rot="16200000" flipH="1">
-            <a:off x="2083786" y="1508190"/>
+            <a:off x="7892071" y="2116307"/>
             <a:ext cx="140324" cy="95843"/>
           </a:xfrm>
           <a:prstGeom prst="triangle">
@@ -6343,13 +6068,13 @@
       </p:sp>
       <p:sp>
         <p:nvSpPr>
-          <p:cNvPr id="53" name="Isosceles Triangle 52"/>
+          <p:cNvPr id="55" name="Isosceles Triangle 54"/>
           <p:cNvSpPr/>
           <p:nvPr/>
         </p:nvSpPr>
         <p:spPr>
           <a:xfrm rot="16200000" flipH="1">
-            <a:off x="2558269" y="2115207"/>
+            <a:off x="7391107" y="1525037"/>
             <a:ext cx="140324" cy="95843"/>
           </a:xfrm>
           <a:prstGeom prst="triangle">
@@ -6387,98 +6112,166 @@
           </a:p>
         </p:txBody>
       </p:sp>
-      <p:sp>
-        <p:nvSpPr>
-          <p:cNvPr id="54" name="Isosceles Triangle 53"/>
-          <p:cNvSpPr/>
+      <p:grpSp>
+        <p:nvGrpSpPr>
+          <p:cNvPr id="7" name="Group 6">
+            <a:extLst>
+              <a:ext uri="{FF2B5EF4-FFF2-40B4-BE49-F238E27FC236}">
+                <a16:creationId xmlns:a16="http://schemas.microsoft.com/office/drawing/2014/main" id="{BD1EBEBF-D028-7071-FAD5-ED03297BD9DD}"/>
+              </a:ext>
+            </a:extLst>
+          </p:cNvPr>
+          <p:cNvGrpSpPr/>
           <p:nvPr/>
-        </p:nvSpPr>
-        <p:spPr>
-          <a:xfrm rot="16200000" flipH="1">
-            <a:off x="7892071" y="2116307"/>
-            <a:ext cx="140324" cy="95843"/>
-          </a:xfrm>
-          <a:prstGeom prst="triangle">
-            <a:avLst/>
-          </a:prstGeom>
-          <a:solidFill>
-            <a:schemeClr val="tx1"/>
-          </a:solidFill>
-          <a:ln>
+        </p:nvGrpSpPr>
+        <p:grpSpPr>
+          <a:xfrm>
+            <a:off x="6136534" y="1913930"/>
+            <a:ext cx="369332" cy="1371600"/>
+            <a:chOff x="846975" y="1916832"/>
+            <a:chExt cx="369332" cy="1371600"/>
+          </a:xfrm>
+        </p:grpSpPr>
+        <p:sp>
+          <p:nvSpPr>
+            <p:cNvPr id="8" name="TextBox 7">
+              <a:extLst>
+                <a:ext uri="{FF2B5EF4-FFF2-40B4-BE49-F238E27FC236}">
+                  <a16:creationId xmlns:a16="http://schemas.microsoft.com/office/drawing/2014/main" id="{B05DE082-0E3B-5794-9AF7-6F1B94E3A5F4}"/>
+                </a:ext>
+              </a:extLst>
+            </p:cNvPr>
+            <p:cNvSpPr txBox="1"/>
+            <p:nvPr/>
+          </p:nvSpPr>
+          <p:spPr>
+            <a:xfrm rot="16200000">
+              <a:off x="345841" y="2417966"/>
+              <a:ext cx="1371600" cy="369332"/>
+            </a:xfrm>
+            <a:prstGeom prst="rect">
+              <a:avLst/>
+            </a:prstGeom>
             <a:noFill/>
-          </a:ln>
-        </p:spPr>
-        <p:style>
-          <a:lnRef idx="2">
-            <a:schemeClr val="accent1">
-              <a:shade val="50000"/>
-            </a:schemeClr>
-          </a:lnRef>
-          <a:fillRef idx="1">
-            <a:schemeClr val="accent1"/>
-          </a:fillRef>
-          <a:effectRef idx="0">
-            <a:schemeClr val="accent1"/>
-          </a:effectRef>
-          <a:fontRef idx="minor">
-            <a:schemeClr val="lt1"/>
-          </a:fontRef>
-        </p:style>
-        <p:txBody>
-          <a:bodyPr rtlCol="0" anchor="ctr"/>
-          <a:lstStyle/>
-          <a:p>
-            <a:pPr algn="ctr"/>
-            <a:endParaRPr lang="en-US"/>
-          </a:p>
-        </p:txBody>
-      </p:sp>
-      <p:sp>
-        <p:nvSpPr>
-          <p:cNvPr id="55" name="Isosceles Triangle 54"/>
-          <p:cNvSpPr/>
-          <p:nvPr/>
-        </p:nvSpPr>
-        <p:spPr>
-          <a:xfrm rot="16200000" flipH="1">
-            <a:off x="7391107" y="1525037"/>
-            <a:ext cx="140324" cy="95843"/>
-          </a:xfrm>
-          <a:prstGeom prst="triangle">
-            <a:avLst/>
-          </a:prstGeom>
-          <a:solidFill>
-            <a:schemeClr val="tx1"/>
-          </a:solidFill>
-          <a:ln>
-            <a:noFill/>
-          </a:ln>
-        </p:spPr>
-        <p:style>
-          <a:lnRef idx="2">
-            <a:schemeClr val="accent1">
-              <a:shade val="50000"/>
-            </a:schemeClr>
-          </a:lnRef>
-          <a:fillRef idx="1">
-            <a:schemeClr val="accent1"/>
-          </a:fillRef>
-          <a:effectRef idx="0">
-            <a:schemeClr val="accent1"/>
-          </a:effectRef>
-          <a:fontRef idx="minor">
-            <a:schemeClr val="lt1"/>
-          </a:fontRef>
-        </p:style>
-        <p:txBody>
-          <a:bodyPr rtlCol="0" anchor="ctr"/>
-          <a:lstStyle/>
-          <a:p>
-            <a:pPr algn="ctr"/>
-            <a:endParaRPr lang="en-US"/>
-          </a:p>
-        </p:txBody>
-      </p:sp>
+          </p:spPr>
+          <p:txBody>
+            <a:bodyPr wrap="square" rtlCol="0">
+              <a:spAutoFit/>
+            </a:bodyPr>
+            <a:lstStyle/>
+            <a:p>
+              <a:pPr marL="0" marR="0" lvl="0" indent="0" defTabSz="914400" eaLnBrk="1" fontAlgn="auto" latinLnBrk="0" hangingPunct="1">
+                <a:lnSpc>
+                  <a:spcPct val="100000"/>
+                </a:lnSpc>
+                <a:spcBef>
+                  <a:spcPts val="0"/>
+                </a:spcBef>
+                <a:spcAft>
+                  <a:spcPts val="0"/>
+                </a:spcAft>
+                <a:buClrTx/>
+                <a:buSzTx/>
+                <a:buFontTx/>
+                <a:buNone/>
+                <a:tabLst/>
+                <a:defRPr/>
+              </a:pPr>
+              <a:r>
+                <a:rPr kumimoji="0" lang="en-US" sz="1800" b="0" i="0" u="none" strike="noStrike" kern="0" cap="none" spc="0" normalizeH="0" baseline="0" noProof="0" dirty="0">
+                  <a:ln>
+                    <a:noFill/>
+                  </a:ln>
+                  <a:solidFill>
+                    <a:sysClr val="windowText" lastClr="000000"/>
+                  </a:solidFill>
+                  <a:effectLst/>
+                  <a:uLnTx/>
+                  <a:uFillTx/>
+                  <a:latin typeface="Calibri" pitchFamily="34" charset="0"/>
+                </a:rPr>
+                <a:t> </a:t>
+              </a:r>
+              <a:r>
+                <a:rPr lang="en-US" b="1" kern="0" dirty="0">
+                  <a:solidFill>
+                    <a:sysClr val="windowText" lastClr="000000"/>
+                  </a:solidFill>
+                  <a:latin typeface="Calibri" pitchFamily="34" charset="0"/>
+                </a:rPr>
+                <a:t>  </a:t>
+              </a:r>
+              <a:r>
+                <a:rPr kumimoji="0" lang="en-US" sz="1800" b="0" i="0" u="none" strike="noStrike" kern="0" cap="none" spc="0" normalizeH="0" baseline="0" noProof="0" dirty="0">
+                  <a:ln>
+                    <a:noFill/>
+                  </a:ln>
+                  <a:solidFill>
+                    <a:sysClr val="windowText" lastClr="000000"/>
+                  </a:solidFill>
+                  <a:effectLst/>
+                  <a:uLnTx/>
+                  <a:uFillTx/>
+                  <a:latin typeface="Calibri" pitchFamily="34" charset="0"/>
+                </a:rPr>
+                <a:t>played on</a:t>
+              </a:r>
+            </a:p>
+          </p:txBody>
+        </p:sp>
+        <p:sp>
+          <p:nvSpPr>
+            <p:cNvPr id="9" name="Isosceles Triangle 8">
+              <a:extLst>
+                <a:ext uri="{FF2B5EF4-FFF2-40B4-BE49-F238E27FC236}">
+                  <a16:creationId xmlns:a16="http://schemas.microsoft.com/office/drawing/2014/main" id="{F5273304-A940-2F42-D934-B8653A46D5A1}"/>
+                </a:ext>
+              </a:extLst>
+            </p:cNvPr>
+            <p:cNvSpPr/>
+            <p:nvPr/>
+          </p:nvSpPr>
+          <p:spPr>
+            <a:xfrm flipV="1">
+              <a:off x="992558" y="3092749"/>
+              <a:ext cx="140324" cy="95843"/>
+            </a:xfrm>
+            <a:prstGeom prst="triangle">
+              <a:avLst/>
+            </a:prstGeom>
+            <a:solidFill>
+              <a:schemeClr val="tx1"/>
+            </a:solidFill>
+            <a:ln>
+              <a:noFill/>
+            </a:ln>
+          </p:spPr>
+          <p:style>
+            <a:lnRef idx="2">
+              <a:schemeClr val="accent1">
+                <a:shade val="50000"/>
+              </a:schemeClr>
+            </a:lnRef>
+            <a:fillRef idx="1">
+              <a:schemeClr val="accent1"/>
+            </a:fillRef>
+            <a:effectRef idx="0">
+              <a:schemeClr val="accent1"/>
+            </a:effectRef>
+            <a:fontRef idx="minor">
+              <a:schemeClr val="lt1"/>
+            </a:fontRef>
+          </p:style>
+          <p:txBody>
+            <a:bodyPr rtlCol="0" anchor="ctr"/>
+            <a:lstStyle/>
+            <a:p>
+              <a:pPr algn="ctr"/>
+              <a:endParaRPr lang="en-US"/>
+            </a:p>
+          </p:txBody>
+        </p:sp>
+      </p:grpSp>
     </p:spTree>
     <p:extLst>
       <p:ext uri="{BB962C8B-B14F-4D97-AF65-F5344CB8AC3E}">
@@ -6489,13 +6282,6 @@
   <p:clrMapOvr>
     <a:masterClrMapping/>
   </p:clrMapOvr>
-  <p:timing>
-    <p:tnLst>
-      <p:par>
-        <p:cTn id="1" dur="indefinite" restart="never" nodeType="tmRoot"/>
-      </p:par>
-    </p:tnLst>
-  </p:timing>
 </p:sld>
 </file>
 

</xml_diff>